<commit_message>
Updated Mortality Components PPT
</commit_message>
<xml_diff>
--- a/modules/Mortality/PPT_Components.pptx
+++ b/modules/Mortality/PPT_Components.pptx
@@ -5,20 +5,23 @@
     <p:sldMasterId id="2147483648" r:id="rId1"/>
   </p:sldMasterIdLst>
   <p:notesMasterIdLst>
-    <p:notesMasterId r:id="rId10"/>
+    <p:notesMasterId r:id="rId13"/>
   </p:notesMasterIdLst>
   <p:handoutMasterIdLst>
-    <p:handoutMasterId r:id="rId11"/>
+    <p:handoutMasterId r:id="rId14"/>
   </p:handoutMasterIdLst>
   <p:sldIdLst>
     <p:sldId id="324" r:id="rId2"/>
-    <p:sldId id="325" r:id="rId3"/>
-    <p:sldId id="326" r:id="rId4"/>
-    <p:sldId id="329" r:id="rId5"/>
-    <p:sldId id="314" r:id="rId6"/>
-    <p:sldId id="317" r:id="rId7"/>
-    <p:sldId id="318" r:id="rId8"/>
-    <p:sldId id="319" r:id="rId9"/>
+    <p:sldId id="330" r:id="rId3"/>
+    <p:sldId id="325" r:id="rId4"/>
+    <p:sldId id="326" r:id="rId5"/>
+    <p:sldId id="329" r:id="rId6"/>
+    <p:sldId id="332" r:id="rId7"/>
+    <p:sldId id="331" r:id="rId8"/>
+    <p:sldId id="314" r:id="rId9"/>
+    <p:sldId id="317" r:id="rId10"/>
+    <p:sldId id="318" r:id="rId11"/>
+    <p:sldId id="319" r:id="rId12"/>
   </p:sldIdLst>
   <p:sldSz cx="9144000" cy="6858000" type="screen4x3"/>
   <p:notesSz cx="6858000" cy="9190038"/>
@@ -889,7 +892,7 @@
             <a:fld id="{90DA5176-CD48-4645-8A68-A0B4376181E0}" type="slidenum">
               <a:rPr lang="en-US" smtClean="0"/>
               <a:pPr/>
-              <a:t>2</a:t>
+              <a:t>3</a:t>
             </a:fld>
             <a:endParaRPr lang="en-US"/>
           </a:p>
@@ -952,14 +955,6 @@
           <a:bodyPr/>
           <a:lstStyle/>
           <a:p>
-            <a:r>
-              <a:rPr lang="en-US" dirty="0" err="1" smtClean="0"/>
-              <a:t>Tmass</a:t>
-            </a:r>
-            <a:r>
-              <a:rPr lang="en-US" dirty="0" smtClean="0"/>
-              <a:t> is age at 50% maturity</a:t>
-            </a:r>
             <a:endParaRPr lang="en-US" dirty="0"/>
           </a:p>
         </p:txBody>
@@ -982,7 +977,7 @@
             <a:fld id="{90DA5176-CD48-4645-8A68-A0B4376181E0}" type="slidenum">
               <a:rPr lang="en-US" smtClean="0"/>
               <a:pPr/>
-              <a:t>3</a:t>
+              <a:t>4</a:t>
             </a:fld>
             <a:endParaRPr lang="en-US"/>
           </a:p>
@@ -1046,12 +1041,8 @@
           <a:lstStyle/>
           <a:p>
             <a:r>
-              <a:rPr lang="en-US" dirty="0" err="1" smtClean="0"/>
-              <a:t>Tmass</a:t>
-            </a:r>
-            <a:r>
               <a:rPr lang="en-US" dirty="0" smtClean="0"/>
-              <a:t> is age at 50% maturity</a:t>
+              <a:t>Draw the graphic</a:t>
             </a:r>
             <a:endParaRPr lang="en-US" dirty="0"/>
           </a:p>
@@ -1075,7 +1066,7 @@
             <a:fld id="{90DA5176-CD48-4645-8A68-A0B4376181E0}" type="slidenum">
               <a:rPr lang="en-US" smtClean="0"/>
               <a:pPr/>
-              <a:t>4</a:t>
+              <a:t>5</a:t>
             </a:fld>
             <a:endParaRPr lang="en-US"/>
           </a:p>
@@ -3981,7 +3972,7 @@
         </p:nvSpPr>
         <p:spPr>
           <a:xfrm>
-            <a:off x="1143000" y="762000"/>
+            <a:off x="1143000" y="1066800"/>
             <a:ext cx="7162800" cy="3048000"/>
           </a:xfrm>
           <a:prstGeom prst="rect">
@@ -4027,7 +4018,7 @@
         </p:nvSpPr>
         <p:spPr>
           <a:xfrm>
-            <a:off x="1447800" y="1066800"/>
+            <a:off x="1447800" y="1371600"/>
             <a:ext cx="1691640" cy="640080"/>
           </a:xfrm>
           <a:prstGeom prst="rect">
@@ -4087,7 +4078,7 @@
         </p:nvSpPr>
         <p:spPr>
           <a:xfrm>
-            <a:off x="1457739" y="2712720"/>
+            <a:off x="1457739" y="3017520"/>
             <a:ext cx="1691640" cy="640080"/>
           </a:xfrm>
           <a:prstGeom prst="rect">
@@ -4148,7 +4139,7 @@
         </p:nvSpPr>
         <p:spPr>
           <a:xfrm>
-            <a:off x="6208644" y="2712720"/>
+            <a:off x="6208644" y="3017520"/>
             <a:ext cx="1691640" cy="640080"/>
           </a:xfrm>
           <a:prstGeom prst="rect">
@@ -4214,7 +4205,7 @@
         </p:nvCxnSpPr>
         <p:spPr>
           <a:xfrm>
-            <a:off x="3139440" y="1386840"/>
+            <a:off x="3139440" y="1691640"/>
             <a:ext cx="528099" cy="634116"/>
           </a:xfrm>
           <a:prstGeom prst="straightConnector1">
@@ -4251,7 +4242,7 @@
         </p:nvCxnSpPr>
         <p:spPr>
           <a:xfrm flipV="1">
-            <a:off x="3149379" y="2478156"/>
+            <a:off x="3149379" y="2782956"/>
             <a:ext cx="518160" cy="554604"/>
           </a:xfrm>
           <a:prstGeom prst="straightConnector1">
@@ -4290,7 +4281,7 @@
         </p:nvCxnSpPr>
         <p:spPr>
           <a:xfrm flipV="1">
-            <a:off x="5506278" y="1386840"/>
+            <a:off x="5506278" y="1691640"/>
             <a:ext cx="692427" cy="634116"/>
           </a:xfrm>
           <a:prstGeom prst="straightConnector1">
@@ -4332,7 +4323,7 @@
         </p:nvCxnSpPr>
         <p:spPr>
           <a:xfrm>
-            <a:off x="5506278" y="2209800"/>
+            <a:off x="5506278" y="2514600"/>
             <a:ext cx="675861" cy="15240"/>
           </a:xfrm>
           <a:prstGeom prst="straightConnector1">
@@ -4374,7 +4365,7 @@
         </p:nvCxnSpPr>
         <p:spPr>
           <a:xfrm>
-            <a:off x="5506278" y="2494854"/>
+            <a:off x="5506278" y="2799654"/>
             <a:ext cx="702366" cy="537906"/>
           </a:xfrm>
           <a:prstGeom prst="straightConnector1">
@@ -4414,7 +4405,7 @@
         </p:nvSpPr>
         <p:spPr>
           <a:xfrm>
-            <a:off x="3667539" y="1752600"/>
+            <a:off x="3667539" y="2057400"/>
             <a:ext cx="1828800" cy="914400"/>
           </a:xfrm>
           <a:prstGeom prst="rect">
@@ -4477,7 +4468,7 @@
         </p:nvSpPr>
         <p:spPr>
           <a:xfrm>
-            <a:off x="1143000" y="762000"/>
+            <a:off x="1143000" y="1066800"/>
             <a:ext cx="7162800" cy="3048000"/>
           </a:xfrm>
           <a:prstGeom prst="rect">
@@ -4524,7 +4515,7 @@
         </p:nvSpPr>
         <p:spPr>
           <a:xfrm>
-            <a:off x="5670699" y="778865"/>
+            <a:off x="5670699" y="1083665"/>
             <a:ext cx="2728291" cy="2029902"/>
           </a:xfrm>
           <a:prstGeom prst="ellipse">
@@ -4569,7 +4560,7 @@
         </p:nvSpPr>
         <p:spPr>
           <a:xfrm>
-            <a:off x="6198705" y="1066800"/>
+            <a:off x="6198705" y="1371600"/>
             <a:ext cx="1691640" cy="640080"/>
           </a:xfrm>
           <a:prstGeom prst="rect">
@@ -4632,7 +4623,7 @@
         </p:nvSpPr>
         <p:spPr>
           <a:xfrm>
-            <a:off x="6182139" y="1905000"/>
+            <a:off x="6182139" y="2209800"/>
             <a:ext cx="1691640" cy="640080"/>
           </a:xfrm>
           <a:prstGeom prst="rect">
@@ -4697,8 +4688,8 @@
         </p:nvSpPr>
         <p:spPr bwMode="auto">
           <a:xfrm>
-            <a:off x="457200" y="3886200"/>
-            <a:ext cx="8229600" cy="2514600"/>
+            <a:off x="457200" y="4572000"/>
+            <a:ext cx="8229600" cy="1143000"/>
           </a:xfrm>
           <a:prstGeom prst="rect">
             <a:avLst/>
@@ -4866,8 +4857,8 @@
               <a:buChar char="•"/>
             </a:pPr>
             <a:r>
-              <a:rPr lang="en-US" b="0" dirty="0" smtClean="0"/>
-              <a:t>F = instantaneous fishing mortality.</a:t>
+              <a:rPr lang="en-US" sz="3200" b="0" dirty="0"/>
+              <a:t>M = instantaneous natural mortality.</a:t>
             </a:r>
           </a:p>
           <a:p>
@@ -4879,56 +4870,9 @@
               <a:buChar char="•"/>
             </a:pPr>
             <a:r>
-              <a:rPr lang="en-US" b="0" dirty="0" smtClean="0"/>
-              <a:t>M = instantaneous natural mortality.</a:t>
-            </a:r>
-          </a:p>
-          <a:p>
-            <a:pPr marL="742950" lvl="1" indent="-285750" algn="l">
-              <a:lnSpc>
-                <a:spcPct val="90000"/>
-              </a:lnSpc>
-              <a:buFont typeface="Arial" pitchFamily="34" charset="0"/>
-              <a:buChar char="•"/>
-            </a:pPr>
-            <a:endParaRPr lang="en-US" sz="1600" b="0" dirty="0" smtClean="0"/>
-          </a:p>
-          <a:p>
-            <a:pPr marL="457200" indent="-457200" algn="l">
-              <a:lnSpc>
-                <a:spcPct val="90000"/>
-              </a:lnSpc>
-              <a:buFont typeface="Arial" pitchFamily="34" charset="0"/>
-              <a:buChar char="•"/>
-            </a:pPr>
-            <a:r>
-              <a:rPr lang="en-US" b="0" dirty="0" smtClean="0"/>
-              <a:t>Components are additive; Thus, Z = F+M</a:t>
-            </a:r>
-          </a:p>
-          <a:p>
-            <a:pPr marL="285750" indent="-285750" algn="l">
-              <a:lnSpc>
-                <a:spcPct val="90000"/>
-              </a:lnSpc>
-              <a:buFont typeface="Arial" pitchFamily="34" charset="0"/>
-              <a:buChar char="•"/>
-            </a:pPr>
-            <a:endParaRPr lang="en-US" sz="1600" b="0" dirty="0" smtClean="0"/>
-          </a:p>
-          <a:p>
-            <a:pPr marL="457200" indent="-457200" algn="l">
-              <a:lnSpc>
-                <a:spcPct val="90000"/>
-              </a:lnSpc>
-              <a:buFont typeface="Arial" pitchFamily="34" charset="0"/>
-              <a:buChar char="•"/>
-            </a:pPr>
-            <a:r>
-              <a:rPr lang="en-US" b="0" dirty="0" smtClean="0"/>
-              <a:t>Controlling F is a major goal of many fisheries management strategies.</a:t>
-            </a:r>
-            <a:endParaRPr lang="en-US" b="0" dirty="0"/>
+              <a:rPr lang="en-US" sz="3200" b="0" dirty="0" smtClean="0"/>
+              <a:t>F = instantaneous fishing mortality.</a:t>
+            </a:r>
           </a:p>
         </p:txBody>
       </p:sp>
@@ -5048,6 +4992,1296 @@
                       </p:childTnLst>
                     </p:cTn>
                   </p:par>
+                </p:childTnLst>
+              </p:cTn>
+              <p:prevCondLst>
+                <p:cond evt="onPrev" delay="0">
+                  <p:tgtEl>
+                    <p:sldTgt/>
+                  </p:tgtEl>
+                </p:cond>
+              </p:prevCondLst>
+              <p:nextCondLst>
+                <p:cond evt="onNext" delay="0">
+                  <p:tgtEl>
+                    <p:sldTgt/>
+                  </p:tgtEl>
+                </p:cond>
+              </p:nextCondLst>
+            </p:seq>
+          </p:childTnLst>
+        </p:cTn>
+      </p:par>
+    </p:tnLst>
+    <p:bldLst>
+      <p:bldP spid="20" grpId="0" build="p"/>
+    </p:bldLst>
+  </p:timing>
+</p:sld>
+</file>
+
+<file path=ppt/slides/slide10.xml><?xml version="1.0" encoding="utf-8"?>
+<p:sld xmlns:a="http://schemas.openxmlformats.org/drawingml/2006/main" xmlns:r="http://schemas.openxmlformats.org/officeDocument/2006/relationships" xmlns:p="http://schemas.openxmlformats.org/presentationml/2006/main">
+  <p:cSld>
+    <p:spTree>
+      <p:nvGrpSpPr>
+        <p:cNvPr id="1" name=""/>
+        <p:cNvGrpSpPr/>
+        <p:nvPr/>
+      </p:nvGrpSpPr>
+      <p:grpSpPr>
+        <a:xfrm>
+          <a:off x="0" y="0"/>
+          <a:ext cx="0" cy="0"/>
+          <a:chOff x="0" y="0"/>
+          <a:chExt cx="0" cy="0"/>
+        </a:xfrm>
+      </p:grpSpPr>
+      <p:sp>
+        <p:nvSpPr>
+          <p:cNvPr id="7" name="Footer Placeholder 3"/>
+          <p:cNvSpPr>
+            <a:spLocks noGrp="1"/>
+          </p:cNvSpPr>
+          <p:nvPr>
+            <p:ph type="ftr" sz="quarter" idx="10"/>
+          </p:nvPr>
+        </p:nvSpPr>
+        <p:spPr/>
+        <p:txBody>
+          <a:bodyPr/>
+          <a:lstStyle/>
+          <a:p>
+            <a:r>
+              <a:rPr lang="en-US"/>
+              <a:t>Catch Curves</a:t>
+            </a:r>
+          </a:p>
+        </p:txBody>
+      </p:sp>
+      <p:sp>
+        <p:nvSpPr>
+          <p:cNvPr id="8" name="Slide Number Placeholder 4"/>
+          <p:cNvSpPr>
+            <a:spLocks noGrp="1"/>
+          </p:cNvSpPr>
+          <p:nvPr>
+            <p:ph type="sldNum" sz="quarter" idx="11"/>
+          </p:nvPr>
+        </p:nvSpPr>
+        <p:spPr/>
+        <p:txBody>
+          <a:bodyPr/>
+          <a:lstStyle/>
+          <a:p>
+            <a:fld id="{2718A24F-E62C-4120-B0DD-8B7B1D480092}" type="slidenum">
+              <a:rPr lang="en-US"/>
+              <a:pPr/>
+              <a:t>10</a:t>
+            </a:fld>
+            <a:endParaRPr lang="en-US"/>
+          </a:p>
+        </p:txBody>
+      </p:sp>
+      <p:sp>
+        <p:nvSpPr>
+          <p:cNvPr id="425986" name="Rectangle 2"/>
+          <p:cNvSpPr>
+            <a:spLocks noGrp="1" noChangeArrowheads="1"/>
+          </p:cNvSpPr>
+          <p:nvPr>
+            <p:ph type="title"/>
+          </p:nvPr>
+        </p:nvSpPr>
+        <p:spPr/>
+        <p:txBody>
+          <a:bodyPr/>
+          <a:lstStyle/>
+          <a:p>
+            <a:r>
+              <a:rPr lang="en-US"/>
+              <a:t>Estimating F with Marked Fish</a:t>
+            </a:r>
+          </a:p>
+        </p:txBody>
+      </p:sp>
+      <p:sp>
+        <p:nvSpPr>
+          <p:cNvPr id="425987" name="Rectangle 3"/>
+          <p:cNvSpPr>
+            <a:spLocks noGrp="1" noChangeArrowheads="1"/>
+          </p:cNvSpPr>
+          <p:nvPr>
+            <p:ph type="body" idx="1"/>
+          </p:nvPr>
+        </p:nvSpPr>
+        <p:spPr>
+          <a:xfrm>
+            <a:off x="457200" y="2438400"/>
+            <a:ext cx="8458200" cy="4038600"/>
+          </a:xfrm>
+        </p:spPr>
+        <p:txBody>
+          <a:bodyPr/>
+          <a:lstStyle/>
+          <a:p>
+            <a:r>
+              <a:rPr lang="en-US"/>
+              <a:t>Examine this model closely …</a:t>
+            </a:r>
+          </a:p>
+          <a:p>
+            <a:pPr lvl="1"/>
+            <a:r>
+              <a:rPr lang="en-US"/>
+              <a:t>Slope is an estimate of –Z</a:t>
+            </a:r>
+          </a:p>
+          <a:p>
+            <a:pPr lvl="1"/>
+            <a:endParaRPr lang="en-US" sz="1400"/>
+          </a:p>
+          <a:p>
+            <a:pPr lvl="1"/>
+            <a:r>
+              <a:rPr lang="en-US"/>
+              <a:t>Intercept is an estimate of …</a:t>
+            </a:r>
+          </a:p>
+          <a:p>
+            <a:pPr lvl="1"/>
+            <a:endParaRPr lang="en-US" sz="1600"/>
+          </a:p>
+          <a:p>
+            <a:pPr lvl="1"/>
+            <a:r>
+              <a:rPr lang="en-US"/>
+              <a:t>Which can be solved for F</a:t>
+            </a:r>
+          </a:p>
+        </p:txBody>
+      </p:sp>
+      <p:pic>
+        <p:nvPicPr>
+          <p:cNvPr id="425988" name="Picture 4"/>
+          <p:cNvPicPr>
+            <a:picLocks noChangeAspect="1" noChangeArrowheads="1"/>
+          </p:cNvPicPr>
+          <p:nvPr/>
+        </p:nvPicPr>
+        <p:blipFill>
+          <a:blip r:embed="rId2"/>
+          <a:srcRect/>
+          <a:stretch>
+            <a:fillRect/>
+          </a:stretch>
+        </p:blipFill>
+        <p:spPr bwMode="auto">
+          <a:xfrm>
+            <a:off x="1066800" y="1066800"/>
+            <a:ext cx="6875463" cy="1228725"/>
+          </a:xfrm>
+          <a:prstGeom prst="rect">
+            <a:avLst/>
+          </a:prstGeom>
+          <a:noFill/>
+          <a:ln w="9525">
+            <a:noFill/>
+            <a:miter lim="800000"/>
+            <a:headEnd/>
+            <a:tailEnd/>
+          </a:ln>
+          <a:effectLst/>
+        </p:spPr>
+      </p:pic>
+      <p:pic>
+        <p:nvPicPr>
+          <p:cNvPr id="425989" name="Picture 5"/>
+          <p:cNvPicPr>
+            <a:picLocks noChangeAspect="1" noChangeArrowheads="1"/>
+          </p:cNvPicPr>
+          <p:nvPr/>
+        </p:nvPicPr>
+        <p:blipFill>
+          <a:blip r:embed="rId3"/>
+          <a:srcRect/>
+          <a:stretch>
+            <a:fillRect/>
+          </a:stretch>
+        </p:blipFill>
+        <p:spPr bwMode="auto">
+          <a:xfrm>
+            <a:off x="2709863" y="5257800"/>
+            <a:ext cx="3724275" cy="1209675"/>
+          </a:xfrm>
+          <a:prstGeom prst="rect">
+            <a:avLst/>
+          </a:prstGeom>
+          <a:noFill/>
+          <a:ln w="9525">
+            <a:noFill/>
+            <a:miter lim="800000"/>
+            <a:headEnd/>
+            <a:tailEnd/>
+          </a:ln>
+          <a:effectLst/>
+        </p:spPr>
+      </p:pic>
+      <p:pic>
+        <p:nvPicPr>
+          <p:cNvPr id="425990" name="Picture 6"/>
+          <p:cNvPicPr>
+            <a:picLocks noChangeAspect="1" noChangeArrowheads="1"/>
+          </p:cNvPicPr>
+          <p:nvPr/>
+        </p:nvPicPr>
+        <p:blipFill>
+          <a:blip r:embed="rId4"/>
+          <a:srcRect/>
+          <a:stretch>
+            <a:fillRect/>
+          </a:stretch>
+        </p:blipFill>
+        <p:spPr bwMode="auto">
+          <a:xfrm>
+            <a:off x="5486400" y="3505200"/>
+            <a:ext cx="3581400" cy="1098550"/>
+          </a:xfrm>
+          <a:prstGeom prst="rect">
+            <a:avLst/>
+          </a:prstGeom>
+          <a:noFill/>
+          <a:ln w="9525">
+            <a:noFill/>
+            <a:miter lim="800000"/>
+            <a:headEnd/>
+            <a:tailEnd/>
+          </a:ln>
+          <a:effectLst/>
+        </p:spPr>
+      </p:pic>
+    </p:spTree>
+  </p:cSld>
+  <p:clrMapOvr>
+    <a:masterClrMapping/>
+  </p:clrMapOvr>
+  <p:timing>
+    <p:tnLst>
+      <p:par>
+        <p:cTn id="1" dur="indefinite" restart="never" nodeType="tmRoot">
+          <p:childTnLst>
+            <p:seq concurrent="1" nextAc="seek">
+              <p:cTn id="2" dur="indefinite" nodeType="mainSeq">
+                <p:childTnLst>
+                  <p:par>
+                    <p:cTn id="3" fill="hold">
+                      <p:stCondLst>
+                        <p:cond delay="indefinite"/>
+                      </p:stCondLst>
+                      <p:childTnLst>
+                        <p:par>
+                          <p:cTn id="4" fill="hold">
+                            <p:stCondLst>
+                              <p:cond delay="0"/>
+                            </p:stCondLst>
+                            <p:childTnLst>
+                              <p:par>
+                                <p:cTn id="5" presetID="1" presetClass="entr" presetSubtype="0" fill="hold" grpId="0" nodeType="clickEffect">
+                                  <p:stCondLst>
+                                    <p:cond delay="0"/>
+                                  </p:stCondLst>
+                                  <p:childTnLst>
+                                    <p:set>
+                                      <p:cBhvr>
+                                        <p:cTn id="6" dur="1" fill="hold">
+                                          <p:stCondLst>
+                                            <p:cond delay="0"/>
+                                          </p:stCondLst>
+                                        </p:cTn>
+                                        <p:tgtEl>
+                                          <p:spTgt spid="425987">
+                                            <p:txEl>
+                                              <p:pRg st="1" end="1"/>
+                                            </p:txEl>
+                                          </p:spTgt>
+                                        </p:tgtEl>
+                                        <p:attrNameLst>
+                                          <p:attrName>style.visibility</p:attrName>
+                                        </p:attrNameLst>
+                                      </p:cBhvr>
+                                      <p:to>
+                                        <p:strVal val="visible"/>
+                                      </p:to>
+                                    </p:set>
+                                  </p:childTnLst>
+                                </p:cTn>
+                              </p:par>
+                            </p:childTnLst>
+                          </p:cTn>
+                        </p:par>
+                      </p:childTnLst>
+                    </p:cTn>
+                  </p:par>
+                  <p:par>
+                    <p:cTn id="7" fill="hold">
+                      <p:stCondLst>
+                        <p:cond delay="indefinite"/>
+                      </p:stCondLst>
+                      <p:childTnLst>
+                        <p:par>
+                          <p:cTn id="8" fill="hold">
+                            <p:stCondLst>
+                              <p:cond delay="0"/>
+                            </p:stCondLst>
+                            <p:childTnLst>
+                              <p:par>
+                                <p:cTn id="9" presetID="1" presetClass="entr" presetSubtype="0" fill="hold" grpId="0" nodeType="clickEffect">
+                                  <p:stCondLst>
+                                    <p:cond delay="0"/>
+                                  </p:stCondLst>
+                                  <p:childTnLst>
+                                    <p:set>
+                                      <p:cBhvr>
+                                        <p:cTn id="10" dur="1" fill="hold">
+                                          <p:stCondLst>
+                                            <p:cond delay="0"/>
+                                          </p:stCondLst>
+                                        </p:cTn>
+                                        <p:tgtEl>
+                                          <p:spTgt spid="425987">
+                                            <p:txEl>
+                                              <p:pRg st="3" end="3"/>
+                                            </p:txEl>
+                                          </p:spTgt>
+                                        </p:tgtEl>
+                                        <p:attrNameLst>
+                                          <p:attrName>style.visibility</p:attrName>
+                                        </p:attrNameLst>
+                                      </p:cBhvr>
+                                      <p:to>
+                                        <p:strVal val="visible"/>
+                                      </p:to>
+                                    </p:set>
+                                  </p:childTnLst>
+                                </p:cTn>
+                              </p:par>
+                              <p:par>
+                                <p:cTn id="11" presetID="1" presetClass="entr" presetSubtype="0" fill="hold" nodeType="withEffect">
+                                  <p:stCondLst>
+                                    <p:cond delay="0"/>
+                                  </p:stCondLst>
+                                  <p:childTnLst>
+                                    <p:set>
+                                      <p:cBhvr>
+                                        <p:cTn id="12" dur="1" fill="hold">
+                                          <p:stCondLst>
+                                            <p:cond delay="0"/>
+                                          </p:stCondLst>
+                                        </p:cTn>
+                                        <p:tgtEl>
+                                          <p:spTgt spid="425990"/>
+                                        </p:tgtEl>
+                                        <p:attrNameLst>
+                                          <p:attrName>style.visibility</p:attrName>
+                                        </p:attrNameLst>
+                                      </p:cBhvr>
+                                      <p:to>
+                                        <p:strVal val="visible"/>
+                                      </p:to>
+                                    </p:set>
+                                  </p:childTnLst>
+                                </p:cTn>
+                              </p:par>
+                            </p:childTnLst>
+                          </p:cTn>
+                        </p:par>
+                      </p:childTnLst>
+                    </p:cTn>
+                  </p:par>
+                  <p:par>
+                    <p:cTn id="13" fill="hold">
+                      <p:stCondLst>
+                        <p:cond delay="indefinite"/>
+                      </p:stCondLst>
+                      <p:childTnLst>
+                        <p:par>
+                          <p:cTn id="14" fill="hold">
+                            <p:stCondLst>
+                              <p:cond delay="0"/>
+                            </p:stCondLst>
+                            <p:childTnLst>
+                              <p:par>
+                                <p:cTn id="15" presetID="1" presetClass="entr" presetSubtype="0" fill="hold" grpId="0" nodeType="clickEffect">
+                                  <p:stCondLst>
+                                    <p:cond delay="0"/>
+                                  </p:stCondLst>
+                                  <p:childTnLst>
+                                    <p:set>
+                                      <p:cBhvr>
+                                        <p:cTn id="16" dur="1" fill="hold">
+                                          <p:stCondLst>
+                                            <p:cond delay="0"/>
+                                          </p:stCondLst>
+                                        </p:cTn>
+                                        <p:tgtEl>
+                                          <p:spTgt spid="425987">
+                                            <p:txEl>
+                                              <p:pRg st="5" end="5"/>
+                                            </p:txEl>
+                                          </p:spTgt>
+                                        </p:tgtEl>
+                                        <p:attrNameLst>
+                                          <p:attrName>style.visibility</p:attrName>
+                                        </p:attrNameLst>
+                                      </p:cBhvr>
+                                      <p:to>
+                                        <p:strVal val="visible"/>
+                                      </p:to>
+                                    </p:set>
+                                  </p:childTnLst>
+                                </p:cTn>
+                              </p:par>
+                            </p:childTnLst>
+                          </p:cTn>
+                        </p:par>
+                      </p:childTnLst>
+                    </p:cTn>
+                  </p:par>
+                  <p:par>
+                    <p:cTn id="17" fill="hold">
+                      <p:stCondLst>
+                        <p:cond delay="indefinite"/>
+                      </p:stCondLst>
+                      <p:childTnLst>
+                        <p:par>
+                          <p:cTn id="18" fill="hold">
+                            <p:stCondLst>
+                              <p:cond delay="0"/>
+                            </p:stCondLst>
+                            <p:childTnLst>
+                              <p:par>
+                                <p:cTn id="19" presetID="9" presetClass="entr" presetSubtype="0" fill="hold" nodeType="clickEffect">
+                                  <p:stCondLst>
+                                    <p:cond delay="0"/>
+                                  </p:stCondLst>
+                                  <p:childTnLst>
+                                    <p:set>
+                                      <p:cBhvr>
+                                        <p:cTn id="20" dur="1" fill="hold">
+                                          <p:stCondLst>
+                                            <p:cond delay="0"/>
+                                          </p:stCondLst>
+                                        </p:cTn>
+                                        <p:tgtEl>
+                                          <p:spTgt spid="425989"/>
+                                        </p:tgtEl>
+                                        <p:attrNameLst>
+                                          <p:attrName>style.visibility</p:attrName>
+                                        </p:attrNameLst>
+                                      </p:cBhvr>
+                                      <p:to>
+                                        <p:strVal val="visible"/>
+                                      </p:to>
+                                    </p:set>
+                                    <p:animEffect transition="in" filter="dissolve">
+                                      <p:cBhvr>
+                                        <p:cTn id="21" dur="500"/>
+                                        <p:tgtEl>
+                                          <p:spTgt spid="425989"/>
+                                        </p:tgtEl>
+                                      </p:cBhvr>
+                                    </p:animEffect>
+                                  </p:childTnLst>
+                                </p:cTn>
+                              </p:par>
+                            </p:childTnLst>
+                          </p:cTn>
+                        </p:par>
+                      </p:childTnLst>
+                    </p:cTn>
+                  </p:par>
+                </p:childTnLst>
+              </p:cTn>
+              <p:prevCondLst>
+                <p:cond evt="onPrev" delay="0">
+                  <p:tgtEl>
+                    <p:sldTgt/>
+                  </p:tgtEl>
+                </p:cond>
+              </p:prevCondLst>
+              <p:nextCondLst>
+                <p:cond evt="onNext" delay="0">
+                  <p:tgtEl>
+                    <p:sldTgt/>
+                  </p:tgtEl>
+                </p:cond>
+              </p:nextCondLst>
+            </p:seq>
+          </p:childTnLst>
+        </p:cTn>
+      </p:par>
+    </p:tnLst>
+    <p:bldLst>
+      <p:bldP spid="425987" grpId="0" build="p"/>
+    </p:bldLst>
+  </p:timing>
+</p:sld>
+</file>
+
+<file path=ppt/slides/slide11.xml><?xml version="1.0" encoding="utf-8"?>
+<p:sld xmlns:a="http://schemas.openxmlformats.org/drawingml/2006/main" xmlns:r="http://schemas.openxmlformats.org/officeDocument/2006/relationships" xmlns:p="http://schemas.openxmlformats.org/presentationml/2006/main">
+  <p:cSld>
+    <p:spTree>
+      <p:nvGrpSpPr>
+        <p:cNvPr id="1" name=""/>
+        <p:cNvGrpSpPr/>
+        <p:nvPr/>
+      </p:nvGrpSpPr>
+      <p:grpSpPr>
+        <a:xfrm>
+          <a:off x="0" y="0"/>
+          <a:ext cx="0" cy="0"/>
+          <a:chOff x="0" y="0"/>
+          <a:chExt cx="0" cy="0"/>
+        </a:xfrm>
+      </p:grpSpPr>
+      <p:sp>
+        <p:nvSpPr>
+          <p:cNvPr id="4" name="Footer Placeholder 3"/>
+          <p:cNvSpPr>
+            <a:spLocks noGrp="1"/>
+          </p:cNvSpPr>
+          <p:nvPr>
+            <p:ph type="ftr" sz="quarter" idx="10"/>
+          </p:nvPr>
+        </p:nvSpPr>
+        <p:spPr/>
+        <p:txBody>
+          <a:bodyPr/>
+          <a:lstStyle/>
+          <a:p>
+            <a:r>
+              <a:rPr lang="en-US"/>
+              <a:t>Catch Curves</a:t>
+            </a:r>
+          </a:p>
+        </p:txBody>
+      </p:sp>
+      <p:sp>
+        <p:nvSpPr>
+          <p:cNvPr id="5" name="Slide Number Placeholder 4"/>
+          <p:cNvSpPr>
+            <a:spLocks noGrp="1"/>
+          </p:cNvSpPr>
+          <p:nvPr>
+            <p:ph type="sldNum" sz="quarter" idx="11"/>
+          </p:nvPr>
+        </p:nvSpPr>
+        <p:spPr/>
+        <p:txBody>
+          <a:bodyPr/>
+          <a:lstStyle/>
+          <a:p>
+            <a:fld id="{319D3E82-01FD-44E5-B41C-C049F4B3AA45}" type="slidenum">
+              <a:rPr lang="en-US"/>
+              <a:pPr/>
+              <a:t>11</a:t>
+            </a:fld>
+            <a:endParaRPr lang="en-US"/>
+          </a:p>
+        </p:txBody>
+      </p:sp>
+      <p:sp>
+        <p:nvSpPr>
+          <p:cNvPr id="427010" name="Rectangle 2"/>
+          <p:cNvSpPr>
+            <a:spLocks noGrp="1" noChangeArrowheads="1"/>
+          </p:cNvSpPr>
+          <p:nvPr>
+            <p:ph type="title"/>
+          </p:nvPr>
+        </p:nvSpPr>
+        <p:spPr/>
+        <p:txBody>
+          <a:bodyPr/>
+          <a:lstStyle/>
+          <a:p>
+            <a:r>
+              <a:rPr lang="en-US"/>
+              <a:t>Example</a:t>
+            </a:r>
+          </a:p>
+        </p:txBody>
+      </p:sp>
+      <p:sp>
+        <p:nvSpPr>
+          <p:cNvPr id="427011" name="Rectangle 3"/>
+          <p:cNvSpPr>
+            <a:spLocks noGrp="1" noChangeArrowheads="1"/>
+          </p:cNvSpPr>
+          <p:nvPr>
+            <p:ph type="body" idx="1"/>
+          </p:nvPr>
+        </p:nvSpPr>
+        <p:spPr>
+          <a:xfrm>
+            <a:off x="457200" y="1143000"/>
+            <a:ext cx="8534400" cy="5334000"/>
+          </a:xfrm>
+        </p:spPr>
+        <p:txBody>
+          <a:bodyPr/>
+          <a:lstStyle/>
+          <a:p>
+            <a:r>
+              <a:rPr lang="en-US" dirty="0"/>
+              <a:t>400 fish were initially tagged</a:t>
+            </a:r>
+          </a:p>
+          <a:p>
+            <a:r>
+              <a:rPr lang="en-US" dirty="0"/>
+              <a:t>Tags were returned from the fishery over the next four years</a:t>
+            </a:r>
+          </a:p>
+          <a:p>
+            <a:pPr lvl="1"/>
+            <a:r>
+              <a:rPr lang="en-US" dirty="0"/>
+              <a:t>Consider the time period to be the midpoints of the years.</a:t>
+            </a:r>
+          </a:p>
+          <a:p>
+            <a:endParaRPr lang="en-US" dirty="0"/>
+          </a:p>
+          <a:p>
+            <a:r>
+              <a:rPr lang="en-US" dirty="0"/>
+              <a:t>Use these data to estimate Z &amp; F (see HO).</a:t>
+            </a:r>
+          </a:p>
+        </p:txBody>
+      </p:sp>
+    </p:spTree>
+  </p:cSld>
+  <p:clrMapOvr>
+    <a:masterClrMapping/>
+  </p:clrMapOvr>
+  <p:timing>
+    <p:tnLst>
+      <p:par>
+        <p:cTn id="1" dur="indefinite" restart="never" nodeType="tmRoot">
+          <p:childTnLst>
+            <p:seq concurrent="1" nextAc="seek">
+              <p:cTn id="2" dur="indefinite" nodeType="mainSeq">
+                <p:childTnLst>
+                  <p:par>
+                    <p:cTn id="3" fill="hold">
+                      <p:stCondLst>
+                        <p:cond delay="indefinite"/>
+                      </p:stCondLst>
+                      <p:childTnLst>
+                        <p:par>
+                          <p:cTn id="4" fill="hold">
+                            <p:stCondLst>
+                              <p:cond delay="0"/>
+                            </p:stCondLst>
+                            <p:childTnLst>
+                              <p:par>
+                                <p:cTn id="5" presetID="1" presetClass="entr" presetSubtype="0" fill="hold" grpId="0" nodeType="clickEffect">
+                                  <p:stCondLst>
+                                    <p:cond delay="0"/>
+                                  </p:stCondLst>
+                                  <p:childTnLst>
+                                    <p:set>
+                                      <p:cBhvr>
+                                        <p:cTn id="6" dur="1" fill="hold">
+                                          <p:stCondLst>
+                                            <p:cond delay="0"/>
+                                          </p:stCondLst>
+                                        </p:cTn>
+                                        <p:tgtEl>
+                                          <p:spTgt spid="427011">
+                                            <p:txEl>
+                                              <p:pRg st="1" end="1"/>
+                                            </p:txEl>
+                                          </p:spTgt>
+                                        </p:tgtEl>
+                                        <p:attrNameLst>
+                                          <p:attrName>style.visibility</p:attrName>
+                                        </p:attrNameLst>
+                                      </p:cBhvr>
+                                      <p:to>
+                                        <p:strVal val="visible"/>
+                                      </p:to>
+                                    </p:set>
+                                  </p:childTnLst>
+                                </p:cTn>
+                              </p:par>
+                            </p:childTnLst>
+                          </p:cTn>
+                        </p:par>
+                      </p:childTnLst>
+                    </p:cTn>
+                  </p:par>
+                  <p:par>
+                    <p:cTn id="7" fill="hold">
+                      <p:stCondLst>
+                        <p:cond delay="indefinite"/>
+                      </p:stCondLst>
+                      <p:childTnLst>
+                        <p:par>
+                          <p:cTn id="8" fill="hold">
+                            <p:stCondLst>
+                              <p:cond delay="0"/>
+                            </p:stCondLst>
+                            <p:childTnLst>
+                              <p:par>
+                                <p:cTn id="9" presetID="1" presetClass="entr" presetSubtype="0" fill="hold" grpId="0" nodeType="clickEffect">
+                                  <p:stCondLst>
+                                    <p:cond delay="0"/>
+                                  </p:stCondLst>
+                                  <p:childTnLst>
+                                    <p:set>
+                                      <p:cBhvr>
+                                        <p:cTn id="10" dur="1" fill="hold">
+                                          <p:stCondLst>
+                                            <p:cond delay="0"/>
+                                          </p:stCondLst>
+                                        </p:cTn>
+                                        <p:tgtEl>
+                                          <p:spTgt spid="427011">
+                                            <p:txEl>
+                                              <p:pRg st="2" end="2"/>
+                                            </p:txEl>
+                                          </p:spTgt>
+                                        </p:tgtEl>
+                                        <p:attrNameLst>
+                                          <p:attrName>style.visibility</p:attrName>
+                                        </p:attrNameLst>
+                                      </p:cBhvr>
+                                      <p:to>
+                                        <p:strVal val="visible"/>
+                                      </p:to>
+                                    </p:set>
+                                  </p:childTnLst>
+                                </p:cTn>
+                              </p:par>
+                            </p:childTnLst>
+                          </p:cTn>
+                        </p:par>
+                      </p:childTnLst>
+                    </p:cTn>
+                  </p:par>
+                  <p:par>
+                    <p:cTn id="11" fill="hold">
+                      <p:stCondLst>
+                        <p:cond delay="indefinite"/>
+                      </p:stCondLst>
+                      <p:childTnLst>
+                        <p:par>
+                          <p:cTn id="12" fill="hold">
+                            <p:stCondLst>
+                              <p:cond delay="0"/>
+                            </p:stCondLst>
+                            <p:childTnLst>
+                              <p:par>
+                                <p:cTn id="13" presetID="1" presetClass="entr" presetSubtype="0" fill="hold" grpId="0" nodeType="clickEffect">
+                                  <p:stCondLst>
+                                    <p:cond delay="0"/>
+                                  </p:stCondLst>
+                                  <p:childTnLst>
+                                    <p:set>
+                                      <p:cBhvr>
+                                        <p:cTn id="14" dur="1" fill="hold">
+                                          <p:stCondLst>
+                                            <p:cond delay="0"/>
+                                          </p:stCondLst>
+                                        </p:cTn>
+                                        <p:tgtEl>
+                                          <p:spTgt spid="427011">
+                                            <p:txEl>
+                                              <p:pRg st="4" end="4"/>
+                                            </p:txEl>
+                                          </p:spTgt>
+                                        </p:tgtEl>
+                                        <p:attrNameLst>
+                                          <p:attrName>style.visibility</p:attrName>
+                                        </p:attrNameLst>
+                                      </p:cBhvr>
+                                      <p:to>
+                                        <p:strVal val="visible"/>
+                                      </p:to>
+                                    </p:set>
+                                  </p:childTnLst>
+                                </p:cTn>
+                              </p:par>
+                            </p:childTnLst>
+                          </p:cTn>
+                        </p:par>
+                      </p:childTnLst>
+                    </p:cTn>
+                  </p:par>
+                </p:childTnLst>
+              </p:cTn>
+              <p:prevCondLst>
+                <p:cond evt="onPrev" delay="0">
+                  <p:tgtEl>
+                    <p:sldTgt/>
+                  </p:tgtEl>
+                </p:cond>
+              </p:prevCondLst>
+              <p:nextCondLst>
+                <p:cond evt="onNext" delay="0">
+                  <p:tgtEl>
+                    <p:sldTgt/>
+                  </p:tgtEl>
+                </p:cond>
+              </p:nextCondLst>
+            </p:seq>
+          </p:childTnLst>
+        </p:cTn>
+      </p:par>
+    </p:tnLst>
+    <p:bldLst>
+      <p:bldP spid="427011" grpId="0" build="p"/>
+    </p:bldLst>
+  </p:timing>
+</p:sld>
+</file>
+
+<file path=ppt/slides/slide2.xml><?xml version="1.0" encoding="utf-8"?>
+<p:sld xmlns:a="http://schemas.openxmlformats.org/drawingml/2006/main" xmlns:r="http://schemas.openxmlformats.org/officeDocument/2006/relationships" xmlns:p="http://schemas.openxmlformats.org/presentationml/2006/main">
+  <p:cSld>
+    <p:spTree>
+      <p:nvGrpSpPr>
+        <p:cNvPr id="1" name=""/>
+        <p:cNvGrpSpPr/>
+        <p:nvPr/>
+      </p:nvGrpSpPr>
+      <p:grpSpPr>
+        <a:xfrm>
+          <a:off x="0" y="0"/>
+          <a:ext cx="0" cy="0"/>
+          <a:chOff x="0" y="0"/>
+          <a:chExt cx="0" cy="0"/>
+        </a:xfrm>
+      </p:grpSpPr>
+      <p:sp>
+        <p:nvSpPr>
+          <p:cNvPr id="2052" name="Rectangle 4"/>
+          <p:cNvSpPr>
+            <a:spLocks noGrp="1" noChangeArrowheads="1"/>
+          </p:cNvSpPr>
+          <p:nvPr>
+            <p:ph type="ctrTitle"/>
+          </p:nvPr>
+        </p:nvSpPr>
+        <p:spPr>
+          <a:xfrm>
+            <a:off x="685800" y="0"/>
+            <a:ext cx="7772400" cy="914400"/>
+          </a:xfrm>
+        </p:spPr>
+        <p:txBody>
+          <a:bodyPr/>
+          <a:lstStyle/>
+          <a:p>
+            <a:r>
+              <a:rPr lang="en-US" dirty="0" smtClean="0"/>
+              <a:t>Components of Z</a:t>
+            </a:r>
+            <a:endParaRPr lang="en-US" sz="3600" dirty="0"/>
+          </a:p>
+        </p:txBody>
+      </p:sp>
+      <p:sp>
+        <p:nvSpPr>
+          <p:cNvPr id="20" name="Rectangle 3"/>
+          <p:cNvSpPr txBox="1">
+            <a:spLocks noChangeArrowheads="1"/>
+          </p:cNvSpPr>
+          <p:nvPr/>
+        </p:nvSpPr>
+        <p:spPr bwMode="auto">
+          <a:xfrm>
+            <a:off x="457200" y="838200"/>
+            <a:ext cx="8229600" cy="5867400"/>
+          </a:xfrm>
+          <a:prstGeom prst="rect">
+            <a:avLst/>
+          </a:prstGeom>
+          <a:noFill/>
+          <a:ln w="9525">
+            <a:noFill/>
+            <a:miter lim="800000"/>
+            <a:headEnd/>
+            <a:tailEnd/>
+          </a:ln>
+          <a:effectLst/>
+        </p:spPr>
+        <p:txBody>
+          <a:bodyPr vert="horz" wrap="square" lIns="91440" tIns="45720" rIns="91440" bIns="45720" numCol="1" anchor="t" anchorCtr="0" compatLnSpc="1">
+            <a:prstTxWarp prst="textNoShape">
+              <a:avLst/>
+            </a:prstTxWarp>
+          </a:bodyPr>
+          <a:lstStyle>
+            <a:lvl1pPr marL="0" indent="0" algn="ctr" rtl="0" fontAlgn="base">
+              <a:spcBef>
+                <a:spcPct val="20000"/>
+              </a:spcBef>
+              <a:spcAft>
+                <a:spcPct val="0"/>
+              </a:spcAft>
+              <a:buNone/>
+              <a:defRPr sz="3200">
+                <a:solidFill>
+                  <a:schemeClr val="tx1"/>
+                </a:solidFill>
+                <a:latin typeface="+mn-lt"/>
+                <a:ea typeface="+mn-ea"/>
+                <a:cs typeface="+mn-cs"/>
+              </a:defRPr>
+            </a:lvl1pPr>
+            <a:lvl2pPr marL="457200" indent="0" algn="ctr" rtl="0" fontAlgn="base">
+              <a:spcBef>
+                <a:spcPct val="20000"/>
+              </a:spcBef>
+              <a:spcAft>
+                <a:spcPct val="0"/>
+              </a:spcAft>
+              <a:buNone/>
+              <a:defRPr sz="2800">
+                <a:solidFill>
+                  <a:schemeClr val="tx1"/>
+                </a:solidFill>
+                <a:latin typeface="+mn-lt"/>
+              </a:defRPr>
+            </a:lvl2pPr>
+            <a:lvl3pPr marL="914400" indent="0" algn="ctr" rtl="0" fontAlgn="base">
+              <a:spcBef>
+                <a:spcPct val="20000"/>
+              </a:spcBef>
+              <a:spcAft>
+                <a:spcPct val="0"/>
+              </a:spcAft>
+              <a:buNone/>
+              <a:defRPr sz="2400">
+                <a:solidFill>
+                  <a:schemeClr val="tx1"/>
+                </a:solidFill>
+                <a:latin typeface="+mn-lt"/>
+              </a:defRPr>
+            </a:lvl3pPr>
+            <a:lvl4pPr marL="1371600" indent="0" algn="ctr" rtl="0" fontAlgn="base">
+              <a:spcBef>
+                <a:spcPct val="20000"/>
+              </a:spcBef>
+              <a:spcAft>
+                <a:spcPct val="0"/>
+              </a:spcAft>
+              <a:buNone/>
+              <a:defRPr sz="2000">
+                <a:solidFill>
+                  <a:schemeClr val="tx1"/>
+                </a:solidFill>
+                <a:latin typeface="+mn-lt"/>
+              </a:defRPr>
+            </a:lvl4pPr>
+            <a:lvl5pPr marL="1828800" indent="0" algn="ctr" rtl="0" fontAlgn="base">
+              <a:spcBef>
+                <a:spcPct val="20000"/>
+              </a:spcBef>
+              <a:spcAft>
+                <a:spcPct val="0"/>
+              </a:spcAft>
+              <a:buNone/>
+              <a:defRPr sz="2000">
+                <a:solidFill>
+                  <a:schemeClr val="tx1"/>
+                </a:solidFill>
+                <a:latin typeface="+mn-lt"/>
+              </a:defRPr>
+            </a:lvl5pPr>
+            <a:lvl6pPr marL="2286000" indent="0" algn="ctr" rtl="0" fontAlgn="base">
+              <a:spcBef>
+                <a:spcPct val="20000"/>
+              </a:spcBef>
+              <a:spcAft>
+                <a:spcPct val="0"/>
+              </a:spcAft>
+              <a:buNone/>
+              <a:defRPr sz="2000">
+                <a:solidFill>
+                  <a:schemeClr val="tx1"/>
+                </a:solidFill>
+                <a:latin typeface="+mn-lt"/>
+              </a:defRPr>
+            </a:lvl6pPr>
+            <a:lvl7pPr marL="2743200" indent="0" algn="ctr" rtl="0" fontAlgn="base">
+              <a:spcBef>
+                <a:spcPct val="20000"/>
+              </a:spcBef>
+              <a:spcAft>
+                <a:spcPct val="0"/>
+              </a:spcAft>
+              <a:buNone/>
+              <a:defRPr sz="2000">
+                <a:solidFill>
+                  <a:schemeClr val="tx1"/>
+                </a:solidFill>
+                <a:latin typeface="+mn-lt"/>
+              </a:defRPr>
+            </a:lvl7pPr>
+            <a:lvl8pPr marL="3200400" indent="0" algn="ctr" rtl="0" fontAlgn="base">
+              <a:spcBef>
+                <a:spcPct val="20000"/>
+              </a:spcBef>
+              <a:spcAft>
+                <a:spcPct val="0"/>
+              </a:spcAft>
+              <a:buNone/>
+              <a:defRPr sz="2000">
+                <a:solidFill>
+                  <a:schemeClr val="tx1"/>
+                </a:solidFill>
+                <a:latin typeface="+mn-lt"/>
+              </a:defRPr>
+            </a:lvl8pPr>
+            <a:lvl9pPr marL="3657600" indent="0" algn="ctr" rtl="0" fontAlgn="base">
+              <a:spcBef>
+                <a:spcPct val="20000"/>
+              </a:spcBef>
+              <a:spcAft>
+                <a:spcPct val="0"/>
+              </a:spcAft>
+              <a:buNone/>
+              <a:defRPr sz="2000">
+                <a:solidFill>
+                  <a:schemeClr val="tx1"/>
+                </a:solidFill>
+                <a:latin typeface="+mn-lt"/>
+              </a:defRPr>
+            </a:lvl9pPr>
+          </a:lstStyle>
+          <a:p>
+            <a:pPr marL="457200" indent="-457200" algn="l">
+              <a:lnSpc>
+                <a:spcPct val="90000"/>
+              </a:lnSpc>
+              <a:buFont typeface="Arial" pitchFamily="34" charset="0"/>
+              <a:buChar char="•"/>
+            </a:pPr>
+            <a:r>
+              <a:rPr lang="en-US" b="0" dirty="0" smtClean="0"/>
+              <a:t>Components are additive – i.e., Z = F+M</a:t>
+            </a:r>
+          </a:p>
+          <a:p>
+            <a:pPr marL="914400" lvl="1" indent="-457200" algn="l">
+              <a:lnSpc>
+                <a:spcPct val="90000"/>
+              </a:lnSpc>
+              <a:buFont typeface="Arial" pitchFamily="34" charset="0"/>
+              <a:buChar char="•"/>
+            </a:pPr>
+            <a:r>
+              <a:rPr lang="en-US" b="0" dirty="0" smtClean="0"/>
+              <a:t>Does this make sense?</a:t>
+            </a:r>
+          </a:p>
+          <a:p>
+            <a:pPr marL="914400" lvl="1" indent="-457200" algn="l">
+              <a:lnSpc>
+                <a:spcPct val="90000"/>
+              </a:lnSpc>
+              <a:buFont typeface="Arial" pitchFamily="34" charset="0"/>
+              <a:buChar char="•"/>
+            </a:pPr>
+            <a:r>
+              <a:rPr lang="en-US" b="0" dirty="0" smtClean="0"/>
+              <a:t>Primary reason for working with instantaneous rates.</a:t>
+            </a:r>
+          </a:p>
+          <a:p>
+            <a:pPr marL="285750" indent="-285750" algn="l">
+              <a:lnSpc>
+                <a:spcPct val="90000"/>
+              </a:lnSpc>
+              <a:buFont typeface="Arial" pitchFamily="34" charset="0"/>
+              <a:buChar char="•"/>
+            </a:pPr>
+            <a:endParaRPr lang="en-US" sz="1600" b="0" dirty="0" smtClean="0"/>
+          </a:p>
+          <a:p>
+            <a:pPr marL="457200" indent="-457200" algn="l">
+              <a:lnSpc>
+                <a:spcPct val="90000"/>
+              </a:lnSpc>
+              <a:buFont typeface="Arial" pitchFamily="34" charset="0"/>
+              <a:buChar char="•"/>
+            </a:pPr>
+            <a:r>
+              <a:rPr lang="en-US" b="0" dirty="0" smtClean="0"/>
+              <a:t>As a manager, which of these do you want to know?</a:t>
+            </a:r>
+          </a:p>
+          <a:p>
+            <a:pPr marL="914400" lvl="1" indent="-457200" algn="l">
+              <a:lnSpc>
+                <a:spcPct val="90000"/>
+              </a:lnSpc>
+              <a:buFont typeface="Arial" pitchFamily="34" charset="0"/>
+              <a:buChar char="•"/>
+            </a:pPr>
+            <a:r>
+              <a:rPr lang="en-US" b="0" dirty="0" smtClean="0"/>
+              <a:t>Controlling F is a major goal of many fisheries management strategies.</a:t>
+            </a:r>
+          </a:p>
+          <a:p>
+            <a:pPr marL="914400" lvl="1" indent="-457200" algn="l">
+              <a:lnSpc>
+                <a:spcPct val="90000"/>
+              </a:lnSpc>
+              <a:buFont typeface="Arial" pitchFamily="34" charset="0"/>
+              <a:buChar char="•"/>
+            </a:pPr>
+            <a:endParaRPr lang="en-US" b="0" dirty="0"/>
+          </a:p>
+          <a:p>
+            <a:pPr marL="457200" indent="-457200" algn="l">
+              <a:lnSpc>
+                <a:spcPct val="90000"/>
+              </a:lnSpc>
+              <a:buFont typeface="Arial" pitchFamily="34" charset="0"/>
+              <a:buChar char="•"/>
+            </a:pPr>
+            <a:r>
+              <a:rPr lang="en-US" b="0" dirty="0" smtClean="0"/>
+              <a:t>Very difficult to estimate precisely</a:t>
+            </a:r>
+            <a:endParaRPr lang="en-US" b="0" dirty="0"/>
+          </a:p>
+        </p:txBody>
+      </p:sp>
+    </p:spTree>
+    <p:extLst>
+      <p:ext uri="{BB962C8B-B14F-4D97-AF65-F5344CB8AC3E}">
+        <p14:creationId xmlns:p14="http://schemas.microsoft.com/office/powerpoint/2010/main" val="3786883678"/>
+      </p:ext>
+    </p:extLst>
+  </p:cSld>
+  <p:clrMapOvr>
+    <a:masterClrMapping/>
+  </p:clrMapOvr>
+  <p:timing>
+    <p:tnLst>
+      <p:par>
+        <p:cTn id="1" dur="indefinite" restart="never" nodeType="tmRoot">
+          <p:childTnLst>
+            <p:seq concurrent="1" nextAc="seek">
+              <p:cTn id="2" dur="indefinite" nodeType="mainSeq">
+                <p:childTnLst>
+                  <p:par>
+                    <p:cTn id="3" fill="hold">
+                      <p:stCondLst>
+                        <p:cond delay="indefinite"/>
+                      </p:stCondLst>
+                      <p:childTnLst>
+                        <p:par>
+                          <p:cTn id="4" fill="hold">
+                            <p:stCondLst>
+                              <p:cond delay="0"/>
+                            </p:stCondLst>
+                            <p:childTnLst>
+                              <p:par>
+                                <p:cTn id="5" presetID="1" presetClass="entr" presetSubtype="0" fill="hold" grpId="0" nodeType="clickEffect">
+                                  <p:stCondLst>
+                                    <p:cond delay="0"/>
+                                  </p:stCondLst>
+                                  <p:childTnLst>
+                                    <p:set>
+                                      <p:cBhvr>
+                                        <p:cTn id="6" dur="1" fill="hold">
+                                          <p:stCondLst>
+                                            <p:cond delay="0"/>
+                                          </p:stCondLst>
+                                        </p:cTn>
+                                        <p:tgtEl>
+                                          <p:spTgt spid="20">
+                                            <p:txEl>
+                                              <p:pRg st="1" end="1"/>
+                                            </p:txEl>
+                                          </p:spTgt>
+                                        </p:tgtEl>
+                                        <p:attrNameLst>
+                                          <p:attrName>style.visibility</p:attrName>
+                                        </p:attrNameLst>
+                                      </p:cBhvr>
+                                      <p:to>
+                                        <p:strVal val="visible"/>
+                                      </p:to>
+                                    </p:set>
+                                  </p:childTnLst>
+                                </p:cTn>
+                              </p:par>
+                            </p:childTnLst>
+                          </p:cTn>
+                        </p:par>
+                      </p:childTnLst>
+                    </p:cTn>
+                  </p:par>
+                  <p:par>
+                    <p:cTn id="7" fill="hold">
+                      <p:stCondLst>
+                        <p:cond delay="indefinite"/>
+                      </p:stCondLst>
+                      <p:childTnLst>
+                        <p:par>
+                          <p:cTn id="8" fill="hold">
+                            <p:stCondLst>
+                              <p:cond delay="0"/>
+                            </p:stCondLst>
+                            <p:childTnLst>
+                              <p:par>
+                                <p:cTn id="9" presetID="1" presetClass="entr" presetSubtype="0" fill="hold" grpId="0" nodeType="clickEffect">
+                                  <p:stCondLst>
+                                    <p:cond delay="0"/>
+                                  </p:stCondLst>
+                                  <p:childTnLst>
+                                    <p:set>
+                                      <p:cBhvr>
+                                        <p:cTn id="10" dur="1" fill="hold">
+                                          <p:stCondLst>
+                                            <p:cond delay="0"/>
+                                          </p:stCondLst>
+                                        </p:cTn>
+                                        <p:tgtEl>
+                                          <p:spTgt spid="20">
+                                            <p:txEl>
+                                              <p:pRg st="2" end="2"/>
+                                            </p:txEl>
+                                          </p:spTgt>
+                                        </p:tgtEl>
+                                        <p:attrNameLst>
+                                          <p:attrName>style.visibility</p:attrName>
+                                        </p:attrNameLst>
+                                      </p:cBhvr>
+                                      <p:to>
+                                        <p:strVal val="visible"/>
+                                      </p:to>
+                                    </p:set>
+                                  </p:childTnLst>
+                                </p:cTn>
+                              </p:par>
+                            </p:childTnLst>
+                          </p:cTn>
+                        </p:par>
+                      </p:childTnLst>
+                    </p:cTn>
+                  </p:par>
                   <p:par>
                     <p:cTn id="11" fill="hold">
                       <p:stCondLst>
@@ -5076,7 +6310,7 @@
                                         <p:tgtEl>
                                           <p:spTgt spid="20">
                                             <p:txEl>
-                                              <p:pRg st="3" end="3"/>
+                                              <p:pRg st="4" end="4"/>
                                             </p:txEl>
                                           </p:spTgt>
                                         </p:tgtEl>
@@ -5146,6 +6380,55 @@
                       </p:childTnLst>
                     </p:cTn>
                   </p:par>
+                  <p:par>
+                    <p:cTn id="19" fill="hold">
+                      <p:stCondLst>
+                        <p:cond delay="indefinite"/>
+                      </p:stCondLst>
+                      <p:childTnLst>
+                        <p:par>
+                          <p:cTn id="20" fill="hold">
+                            <p:stCondLst>
+                              <p:cond delay="0"/>
+                            </p:stCondLst>
+                            <p:childTnLst>
+                              <p:par>
+                                <p:cTn id="21" presetID="1" presetClass="entr" presetSubtype="0" fill="hold" grpId="0" nodeType="clickEffect">
+                                  <p:stCondLst>
+                                    <p:cond delay="0"/>
+                                  </p:stCondLst>
+                                  <p:childTnLst>
+                                    <p:set>
+                                      <p:cBhvr>
+                                        <p:cTn id="22" dur="1" fill="hold">
+                                          <p:stCondLst>
+                                            <p:cond delay="0"/>
+                                          </p:stCondLst>
+                                        </p:cTn>
+                                        <p:tgtEl>
+                                          <p:spTgt spid="20">
+                                            <p:txEl>
+                                              <p:pRg st="7" end="7"/>
+                                            </p:txEl>
+                                          </p:spTgt>
+                                        </p:tgtEl>
+                                        <p:attrNameLst>
+                                          <p:attrName>style.visibility</p:attrName>
+                                        </p:attrNameLst>
+                                      </p:cBhvr>
+                                      <p:to>
+                                        <p:strVal val="visible"/>
+                                      </p:to>
+                                    </p:set>
+                                  </p:childTnLst>
+                                </p:cTn>
+                              </p:par>
+                            </p:childTnLst>
+                          </p:cTn>
+                        </p:par>
+                      </p:childTnLst>
+                    </p:cTn>
+                  </p:par>
                 </p:childTnLst>
               </p:cTn>
               <p:prevCondLst>
@@ -5168,13 +6451,13 @@
       </p:par>
     </p:tnLst>
     <p:bldLst>
-      <p:bldP spid="20" grpId="0" build="p"/>
+      <p:bldP spid="20" grpId="0" uiExpand="1" build="p"/>
     </p:bldLst>
   </p:timing>
 </p:sld>
 </file>
 
-<file path=ppt/slides/slide2.xml><?xml version="1.0" encoding="utf-8"?>
+<file path=ppt/slides/slide3.xml><?xml version="1.0" encoding="utf-8"?>
 <p:sld xmlns:a="http://schemas.openxmlformats.org/drawingml/2006/main" xmlns:r="http://schemas.openxmlformats.org/officeDocument/2006/relationships" xmlns:p="http://schemas.openxmlformats.org/presentationml/2006/main">
   <p:cSld>
     <p:spTree>
@@ -5296,12 +6579,36 @@
             <a:fld id="{CD41EA97-E434-4B42-9B1A-D37266F43B39}" type="slidenum">
               <a:rPr lang="en-US" smtClean="0"/>
               <a:pPr/>
-              <a:t>2</a:t>
+              <a:t>3</a:t>
             </a:fld>
             <a:endParaRPr lang="en-US"/>
           </a:p>
         </p:txBody>
       </p:sp>
+      <p:pic>
+        <p:nvPicPr>
+          <p:cNvPr id="6" name="Picture 5"/>
+          <p:cNvPicPr>
+            <a:picLocks noChangeAspect="1"/>
+          </p:cNvPicPr>
+          <p:nvPr/>
+        </p:nvPicPr>
+        <p:blipFill>
+          <a:blip r:embed="rId3"/>
+          <a:stretch>
+            <a:fillRect/>
+          </a:stretch>
+        </p:blipFill>
+        <p:spPr>
+          <a:xfrm>
+            <a:off x="152400" y="2883372"/>
+            <a:ext cx="8719633" cy="1917227"/>
+          </a:xfrm>
+          <a:prstGeom prst="rect">
+            <a:avLst/>
+          </a:prstGeom>
+        </p:spPr>
+      </p:pic>
     </p:spTree>
     <p:extLst>
       <p:ext uri="{BB962C8B-B14F-4D97-AF65-F5344CB8AC3E}">
@@ -5369,658 +6676,33 @@
                       </p:childTnLst>
                     </p:cTn>
                   </p:par>
-                </p:childTnLst>
-              </p:cTn>
-              <p:prevCondLst>
-                <p:cond evt="onPrev" delay="0">
-                  <p:tgtEl>
-                    <p:sldTgt/>
-                  </p:tgtEl>
-                </p:cond>
-              </p:prevCondLst>
-              <p:nextCondLst>
-                <p:cond evt="onNext" delay="0">
-                  <p:tgtEl>
-                    <p:sldTgt/>
-                  </p:tgtEl>
-                </p:cond>
-              </p:nextCondLst>
-            </p:seq>
-          </p:childTnLst>
-        </p:cTn>
-      </p:par>
-    </p:tnLst>
-  </p:timing>
-</p:sld>
-</file>
-
-<file path=ppt/slides/slide3.xml><?xml version="1.0" encoding="utf-8"?>
-<p:sld xmlns:a="http://schemas.openxmlformats.org/drawingml/2006/main" xmlns:r="http://schemas.openxmlformats.org/officeDocument/2006/relationships" xmlns:p="http://schemas.openxmlformats.org/presentationml/2006/main">
-  <p:cSld>
-    <p:spTree>
-      <p:nvGrpSpPr>
-        <p:cNvPr id="1" name=""/>
-        <p:cNvGrpSpPr/>
-        <p:nvPr/>
-      </p:nvGrpSpPr>
-      <p:grpSpPr>
-        <a:xfrm>
-          <a:off x="0" y="0"/>
-          <a:ext cx="0" cy="0"/>
-          <a:chOff x="0" y="0"/>
-          <a:chExt cx="0" cy="0"/>
-        </a:xfrm>
-      </p:grpSpPr>
-      <p:sp>
-        <p:nvSpPr>
-          <p:cNvPr id="2" name="Title 1"/>
-          <p:cNvSpPr>
-            <a:spLocks noGrp="1"/>
-          </p:cNvSpPr>
-          <p:nvPr>
-            <p:ph type="title"/>
-          </p:nvPr>
-        </p:nvSpPr>
-        <p:spPr/>
-        <p:txBody>
-          <a:bodyPr/>
-          <a:lstStyle/>
-          <a:p>
-            <a:r>
-              <a:rPr lang="en-US" dirty="0" smtClean="0"/>
-              <a:t>Estimating M</a:t>
-            </a:r>
-            <a:endParaRPr lang="en-US" dirty="0"/>
-          </a:p>
-        </p:txBody>
-      </p:sp>
-      <p:sp>
-        <p:nvSpPr>
-          <p:cNvPr id="3" name="Content Placeholder 2"/>
-          <p:cNvSpPr>
-            <a:spLocks noGrp="1"/>
-          </p:cNvSpPr>
-          <p:nvPr>
-            <p:ph idx="1"/>
-          </p:nvPr>
-        </p:nvSpPr>
-        <p:spPr>
-          <a:xfrm>
-            <a:off x="457200" y="914400"/>
-            <a:ext cx="8229600" cy="5562600"/>
-          </a:xfrm>
-        </p:spPr>
-        <p:txBody>
-          <a:bodyPr/>
-          <a:lstStyle/>
-          <a:p>
-            <a:r>
-              <a:rPr lang="en-US" dirty="0" smtClean="0">
-                <a:solidFill>
-                  <a:schemeClr val="bg1">
-                    <a:lumMod val="75000"/>
-                  </a:schemeClr>
-                </a:solidFill>
-              </a:rPr>
-              <a:t>Assume a constant value for M</a:t>
-            </a:r>
-          </a:p>
-          <a:p>
-            <a:r>
-              <a:rPr lang="en-US" dirty="0" smtClean="0"/>
-              <a:t>Relationship of M to life history traits</a:t>
-            </a:r>
-          </a:p>
-          <a:p>
-            <a:pPr lvl="1"/>
-            <a:r>
-              <a:rPr lang="en-US" dirty="0" smtClean="0"/>
-              <a:t>Hewitt and </a:t>
-            </a:r>
-            <a:r>
-              <a:rPr lang="en-US" dirty="0" err="1" smtClean="0"/>
-              <a:t>Hoenig</a:t>
-            </a:r>
-            <a:r>
-              <a:rPr lang="en-US" dirty="0" smtClean="0"/>
-              <a:t> (2005)</a:t>
-            </a:r>
-          </a:p>
-          <a:p>
-            <a:pPr lvl="1"/>
-            <a:endParaRPr lang="en-US" sz="4000" dirty="0"/>
-          </a:p>
-          <a:p>
-            <a:pPr lvl="1"/>
-            <a:r>
-              <a:rPr lang="en-US" dirty="0" smtClean="0"/>
-              <a:t>Richter and </a:t>
-            </a:r>
-            <a:r>
-              <a:rPr lang="en-US" dirty="0" err="1" smtClean="0"/>
-              <a:t>Efanov</a:t>
-            </a:r>
-            <a:r>
-              <a:rPr lang="en-US" dirty="0" smtClean="0"/>
-              <a:t> (1977)</a:t>
-            </a:r>
-          </a:p>
-          <a:p>
-            <a:pPr lvl="1"/>
-            <a:endParaRPr lang="en-US" dirty="0"/>
-          </a:p>
-          <a:p>
-            <a:pPr lvl="1"/>
-            <a:endParaRPr lang="en-US" dirty="0" smtClean="0"/>
-          </a:p>
-          <a:p>
-            <a:pPr lvl="1"/>
-            <a:r>
-              <a:rPr lang="en-US" dirty="0" err="1" smtClean="0"/>
-              <a:t>Pauly</a:t>
-            </a:r>
-            <a:r>
-              <a:rPr lang="en-US" dirty="0" smtClean="0"/>
-              <a:t> (1980)</a:t>
-            </a:r>
-            <a:endParaRPr lang="en-US" dirty="0"/>
-          </a:p>
-        </p:txBody>
-      </p:sp>
-      <p:sp>
-        <p:nvSpPr>
-          <p:cNvPr id="4" name="Footer Placeholder 3"/>
-          <p:cNvSpPr>
-            <a:spLocks noGrp="1"/>
-          </p:cNvSpPr>
-          <p:nvPr>
-            <p:ph type="ftr" sz="quarter" idx="10"/>
-          </p:nvPr>
-        </p:nvSpPr>
-        <p:spPr/>
-        <p:txBody>
-          <a:bodyPr/>
-          <a:lstStyle/>
-          <a:p>
-            <a:r>
-              <a:rPr lang="en-US" smtClean="0"/>
-              <a:t>Catch Curves</a:t>
-            </a:r>
-            <a:endParaRPr lang="en-US"/>
-          </a:p>
-        </p:txBody>
-      </p:sp>
-      <p:sp>
-        <p:nvSpPr>
-          <p:cNvPr id="5" name="Slide Number Placeholder 4"/>
-          <p:cNvSpPr>
-            <a:spLocks noGrp="1"/>
-          </p:cNvSpPr>
-          <p:nvPr>
-            <p:ph type="sldNum" sz="quarter" idx="11"/>
-          </p:nvPr>
-        </p:nvSpPr>
-        <p:spPr/>
-        <p:txBody>
-          <a:bodyPr/>
-          <a:lstStyle/>
-          <a:p>
-            <a:fld id="{CD41EA97-E434-4B42-9B1A-D37266F43B39}" type="slidenum">
-              <a:rPr lang="en-US" smtClean="0"/>
-              <a:pPr/>
-              <a:t>3</a:t>
-            </a:fld>
-            <a:endParaRPr lang="en-US"/>
-          </a:p>
-        </p:txBody>
-      </p:sp>
-      <p:pic>
-        <p:nvPicPr>
-          <p:cNvPr id="1027" name="Picture 3"/>
-          <p:cNvPicPr>
-            <a:picLocks noChangeAspect="1" noChangeArrowheads="1"/>
-          </p:cNvPicPr>
-          <p:nvPr/>
-        </p:nvPicPr>
-        <p:blipFill>
-          <a:blip r:embed="rId3">
-            <a:extLst>
-              <a:ext uri="{28A0092B-C50C-407E-A947-70E740481C1C}">
-                <a14:useLocalDpi xmlns:a14="http://schemas.microsoft.com/office/drawing/2010/main" val="0"/>
-              </a:ext>
-            </a:extLst>
-          </a:blip>
-          <a:srcRect/>
-          <a:stretch>
-            <a:fillRect/>
-          </a:stretch>
-        </p:blipFill>
-        <p:spPr bwMode="auto">
-          <a:xfrm>
-            <a:off x="5715000" y="2057400"/>
-            <a:ext cx="1676400" cy="1080097"/>
-          </a:xfrm>
-          <a:prstGeom prst="rect">
-            <a:avLst/>
-          </a:prstGeom>
-          <a:noFill/>
-          <a:ln>
-            <a:noFill/>
-          </a:ln>
-          <a:effectLst/>
-          <a:extLst>
-            <a:ext uri="{909E8E84-426E-40DD-AFC4-6F175D3DCCD1}">
-              <a14:hiddenFill xmlns:a14="http://schemas.microsoft.com/office/drawing/2010/main">
-                <a:solidFill>
-                  <a:schemeClr val="accent1"/>
-                </a:solidFill>
-              </a14:hiddenFill>
-            </a:ext>
-            <a:ext uri="{91240B29-F687-4F45-9708-019B960494DF}">
-              <a14:hiddenLine xmlns:a14="http://schemas.microsoft.com/office/drawing/2010/main" w="9525">
-                <a:solidFill>
-                  <a:schemeClr val="tx1"/>
-                </a:solidFill>
-                <a:miter lim="800000"/>
-                <a:headEnd/>
-                <a:tailEnd/>
-              </a14:hiddenLine>
-            </a:ext>
-            <a:ext uri="{AF507438-7753-43E0-B8FC-AC1667EBCBE1}">
-              <a14:hiddenEffects xmlns:a14="http://schemas.microsoft.com/office/drawing/2010/main">
-                <a:effectLst>
-                  <a:outerShdw dist="35921" dir="2700000" algn="ctr" rotWithShape="0">
-                    <a:schemeClr val="bg2"/>
-                  </a:outerShdw>
-                </a:effectLst>
-              </a14:hiddenEffects>
-            </a:ext>
-          </a:extLst>
-        </p:spPr>
-      </p:pic>
-      <p:pic>
-        <p:nvPicPr>
-          <p:cNvPr id="1028" name="Picture 4"/>
-          <p:cNvPicPr>
-            <a:picLocks noChangeAspect="1" noChangeArrowheads="1"/>
-          </p:cNvPicPr>
-          <p:nvPr/>
-        </p:nvPicPr>
-        <p:blipFill>
-          <a:blip r:embed="rId4">
-            <a:extLst>
-              <a:ext uri="{28A0092B-C50C-407E-A947-70E740481C1C}">
-                <a14:useLocalDpi xmlns:a14="http://schemas.microsoft.com/office/drawing/2010/main" val="0"/>
-              </a:ext>
-            </a:extLst>
-          </a:blip>
-          <a:srcRect/>
-          <a:stretch>
-            <a:fillRect/>
-          </a:stretch>
-        </p:blipFill>
-        <p:spPr bwMode="auto">
-          <a:xfrm>
-            <a:off x="1457325" y="5376532"/>
-            <a:ext cx="7360708" cy="990600"/>
-          </a:xfrm>
-          <a:prstGeom prst="rect">
-            <a:avLst/>
-          </a:prstGeom>
-          <a:noFill/>
-          <a:ln>
-            <a:noFill/>
-          </a:ln>
-          <a:effectLst/>
-          <a:extLst>
-            <a:ext uri="{909E8E84-426E-40DD-AFC4-6F175D3DCCD1}">
-              <a14:hiddenFill xmlns:a14="http://schemas.microsoft.com/office/drawing/2010/main">
-                <a:solidFill>
-                  <a:schemeClr val="accent1"/>
-                </a:solidFill>
-              </a14:hiddenFill>
-            </a:ext>
-            <a:ext uri="{91240B29-F687-4F45-9708-019B960494DF}">
-              <a14:hiddenLine xmlns:a14="http://schemas.microsoft.com/office/drawing/2010/main" w="9525">
-                <a:solidFill>
-                  <a:schemeClr val="tx1"/>
-                </a:solidFill>
-                <a:miter lim="800000"/>
-                <a:headEnd/>
-                <a:tailEnd/>
-              </a14:hiddenLine>
-            </a:ext>
-            <a:ext uri="{AF507438-7753-43E0-B8FC-AC1667EBCBE1}">
-              <a14:hiddenEffects xmlns:a14="http://schemas.microsoft.com/office/drawing/2010/main">
-                <a:effectLst>
-                  <a:outerShdw dist="35921" dir="2700000" algn="ctr" rotWithShape="0">
-                    <a:schemeClr val="bg2"/>
-                  </a:outerShdw>
-                </a:effectLst>
-              </a14:hiddenEffects>
-            </a:ext>
-          </a:extLst>
-        </p:spPr>
-      </p:pic>
-      <p:pic>
-        <p:nvPicPr>
-          <p:cNvPr id="1029" name="Picture 5"/>
-          <p:cNvPicPr>
-            <a:picLocks noChangeAspect="1" noChangeArrowheads="1"/>
-          </p:cNvPicPr>
-          <p:nvPr/>
-        </p:nvPicPr>
-        <p:blipFill>
-          <a:blip r:embed="rId5">
-            <a:extLst>
-              <a:ext uri="{28A0092B-C50C-407E-A947-70E740481C1C}">
-                <a14:useLocalDpi xmlns:a14="http://schemas.microsoft.com/office/drawing/2010/main" val="0"/>
-              </a:ext>
-            </a:extLst>
-          </a:blip>
-          <a:srcRect/>
-          <a:stretch>
-            <a:fillRect/>
-          </a:stretch>
-        </p:blipFill>
-        <p:spPr bwMode="auto">
-          <a:xfrm>
-            <a:off x="5727094" y="3362491"/>
-            <a:ext cx="3285875" cy="1361909"/>
-          </a:xfrm>
-          <a:prstGeom prst="rect">
-            <a:avLst/>
-          </a:prstGeom>
-          <a:noFill/>
-          <a:ln>
-            <a:noFill/>
-          </a:ln>
-          <a:effectLst/>
-          <a:extLst>
-            <a:ext uri="{909E8E84-426E-40DD-AFC4-6F175D3DCCD1}">
-              <a14:hiddenFill xmlns:a14="http://schemas.microsoft.com/office/drawing/2010/main">
-                <a:solidFill>
-                  <a:schemeClr val="accent1"/>
-                </a:solidFill>
-              </a14:hiddenFill>
-            </a:ext>
-            <a:ext uri="{91240B29-F687-4F45-9708-019B960494DF}">
-              <a14:hiddenLine xmlns:a14="http://schemas.microsoft.com/office/drawing/2010/main" w="9525">
-                <a:solidFill>
-                  <a:schemeClr val="tx1"/>
-                </a:solidFill>
-                <a:miter lim="800000"/>
-                <a:headEnd/>
-                <a:tailEnd/>
-              </a14:hiddenLine>
-            </a:ext>
-            <a:ext uri="{AF507438-7753-43E0-B8FC-AC1667EBCBE1}">
-              <a14:hiddenEffects xmlns:a14="http://schemas.microsoft.com/office/drawing/2010/main">
-                <a:effectLst>
-                  <a:outerShdw dist="35921" dir="2700000" algn="ctr" rotWithShape="0">
-                    <a:schemeClr val="bg2"/>
-                  </a:outerShdw>
-                </a:effectLst>
-              </a14:hiddenEffects>
-            </a:ext>
-          </a:extLst>
-        </p:spPr>
-      </p:pic>
-    </p:spTree>
-    <p:extLst>
-      <p:ext uri="{BB962C8B-B14F-4D97-AF65-F5344CB8AC3E}">
-        <p14:creationId xmlns:p14="http://schemas.microsoft.com/office/powerpoint/2010/main" val="3695540127"/>
-      </p:ext>
-    </p:extLst>
-  </p:cSld>
-  <p:clrMapOvr>
-    <a:masterClrMapping/>
-  </p:clrMapOvr>
-  <p:timing>
-    <p:tnLst>
-      <p:par>
-        <p:cTn id="1" dur="indefinite" restart="never" nodeType="tmRoot">
-          <p:childTnLst>
-            <p:seq concurrent="1" nextAc="seek">
-              <p:cTn id="2" dur="indefinite" nodeType="mainSeq">
-                <p:childTnLst>
                   <p:par>
-                    <p:cTn id="3" fill="hold">
+                    <p:cTn id="7" fill="hold">
                       <p:stCondLst>
                         <p:cond delay="indefinite"/>
                       </p:stCondLst>
                       <p:childTnLst>
                         <p:par>
-                          <p:cTn id="4" fill="hold">
+                          <p:cTn id="8" fill="hold">
                             <p:stCondLst>
                               <p:cond delay="0"/>
                             </p:stCondLst>
                             <p:childTnLst>
                               <p:par>
-                                <p:cTn id="5" presetID="1" presetClass="entr" presetSubtype="0" fill="hold" grpId="0" nodeType="clickEffect">
+                                <p:cTn id="9" presetID="1" presetClass="entr" presetSubtype="0" fill="hold" nodeType="clickEffect">
                                   <p:stCondLst>
                                     <p:cond delay="0"/>
                                   </p:stCondLst>
                                   <p:childTnLst>
                                     <p:set>
                                       <p:cBhvr>
-                                        <p:cTn id="6" dur="1" fill="hold">
+                                        <p:cTn id="10" dur="1" fill="hold">
                                           <p:stCondLst>
                                             <p:cond delay="0"/>
                                           </p:stCondLst>
                                         </p:cTn>
                                         <p:tgtEl>
-                                          <p:spTgt spid="3">
-                                            <p:txEl>
-                                              <p:pRg st="2" end="2"/>
-                                            </p:txEl>
-                                          </p:spTgt>
-                                        </p:tgtEl>
-                                        <p:attrNameLst>
-                                          <p:attrName>style.visibility</p:attrName>
-                                        </p:attrNameLst>
-                                      </p:cBhvr>
-                                      <p:to>
-                                        <p:strVal val="visible"/>
-                                      </p:to>
-                                    </p:set>
-                                  </p:childTnLst>
-                                </p:cTn>
-                              </p:par>
-                            </p:childTnLst>
-                          </p:cTn>
-                        </p:par>
-                        <p:par>
-                          <p:cTn id="7" fill="hold">
-                            <p:stCondLst>
-                              <p:cond delay="0"/>
-                            </p:stCondLst>
-                            <p:childTnLst>
-                              <p:par>
-                                <p:cTn id="8" presetID="1" presetClass="entr" presetSubtype="0" fill="hold" nodeType="afterEffect">
-                                  <p:stCondLst>
-                                    <p:cond delay="0"/>
-                                  </p:stCondLst>
-                                  <p:childTnLst>
-                                    <p:set>
-                                      <p:cBhvr>
-                                        <p:cTn id="9" dur="1" fill="hold">
-                                          <p:stCondLst>
-                                            <p:cond delay="0"/>
-                                          </p:stCondLst>
-                                        </p:cTn>
-                                        <p:tgtEl>
-                                          <p:spTgt spid="1027"/>
-                                        </p:tgtEl>
-                                        <p:attrNameLst>
-                                          <p:attrName>style.visibility</p:attrName>
-                                        </p:attrNameLst>
-                                      </p:cBhvr>
-                                      <p:to>
-                                        <p:strVal val="visible"/>
-                                      </p:to>
-                                    </p:set>
-                                  </p:childTnLst>
-                                </p:cTn>
-                              </p:par>
-                            </p:childTnLst>
-                          </p:cTn>
-                        </p:par>
-                      </p:childTnLst>
-                    </p:cTn>
-                  </p:par>
-                  <p:par>
-                    <p:cTn id="10" fill="hold">
-                      <p:stCondLst>
-                        <p:cond delay="indefinite"/>
-                      </p:stCondLst>
-                      <p:childTnLst>
-                        <p:par>
-                          <p:cTn id="11" fill="hold">
-                            <p:stCondLst>
-                              <p:cond delay="0"/>
-                            </p:stCondLst>
-                            <p:childTnLst>
-                              <p:par>
-                                <p:cTn id="12" presetID="1" presetClass="entr" presetSubtype="0" fill="hold" grpId="0" nodeType="clickEffect">
-                                  <p:stCondLst>
-                                    <p:cond delay="0"/>
-                                  </p:stCondLst>
-                                  <p:childTnLst>
-                                    <p:set>
-                                      <p:cBhvr>
-                                        <p:cTn id="13" dur="1" fill="hold">
-                                          <p:stCondLst>
-                                            <p:cond delay="0"/>
-                                          </p:stCondLst>
-                                        </p:cTn>
-                                        <p:tgtEl>
-                                          <p:spTgt spid="3">
-                                            <p:txEl>
-                                              <p:pRg st="4" end="4"/>
-                                            </p:txEl>
-                                          </p:spTgt>
-                                        </p:tgtEl>
-                                        <p:attrNameLst>
-                                          <p:attrName>style.visibility</p:attrName>
-                                        </p:attrNameLst>
-                                      </p:cBhvr>
-                                      <p:to>
-                                        <p:strVal val="visible"/>
-                                      </p:to>
-                                    </p:set>
-                                  </p:childTnLst>
-                                </p:cTn>
-                              </p:par>
-                            </p:childTnLst>
-                          </p:cTn>
-                        </p:par>
-                        <p:par>
-                          <p:cTn id="14" fill="hold">
-                            <p:stCondLst>
-                              <p:cond delay="0"/>
-                            </p:stCondLst>
-                            <p:childTnLst>
-                              <p:par>
-                                <p:cTn id="15" presetID="1" presetClass="entr" presetSubtype="0" fill="hold" nodeType="afterEffect">
-                                  <p:stCondLst>
-                                    <p:cond delay="0"/>
-                                  </p:stCondLst>
-                                  <p:childTnLst>
-                                    <p:set>
-                                      <p:cBhvr>
-                                        <p:cTn id="16" dur="1" fill="hold">
-                                          <p:stCondLst>
-                                            <p:cond delay="0"/>
-                                          </p:stCondLst>
-                                        </p:cTn>
-                                        <p:tgtEl>
-                                          <p:spTgt spid="1029"/>
-                                        </p:tgtEl>
-                                        <p:attrNameLst>
-                                          <p:attrName>style.visibility</p:attrName>
-                                        </p:attrNameLst>
-                                      </p:cBhvr>
-                                      <p:to>
-                                        <p:strVal val="visible"/>
-                                      </p:to>
-                                    </p:set>
-                                  </p:childTnLst>
-                                </p:cTn>
-                              </p:par>
-                            </p:childTnLst>
-                          </p:cTn>
-                        </p:par>
-                      </p:childTnLst>
-                    </p:cTn>
-                  </p:par>
-                  <p:par>
-                    <p:cTn id="17" fill="hold">
-                      <p:stCondLst>
-                        <p:cond delay="indefinite"/>
-                      </p:stCondLst>
-                      <p:childTnLst>
-                        <p:par>
-                          <p:cTn id="18" fill="hold">
-                            <p:stCondLst>
-                              <p:cond delay="0"/>
-                            </p:stCondLst>
-                            <p:childTnLst>
-                              <p:par>
-                                <p:cTn id="19" presetID="1" presetClass="entr" presetSubtype="0" fill="hold" grpId="0" nodeType="clickEffect">
-                                  <p:stCondLst>
-                                    <p:cond delay="0"/>
-                                  </p:stCondLst>
-                                  <p:childTnLst>
-                                    <p:set>
-                                      <p:cBhvr>
-                                        <p:cTn id="20" dur="1" fill="hold">
-                                          <p:stCondLst>
-                                            <p:cond delay="0"/>
-                                          </p:stCondLst>
-                                        </p:cTn>
-                                        <p:tgtEl>
-                                          <p:spTgt spid="3">
-                                            <p:txEl>
-                                              <p:pRg st="7" end="7"/>
-                                            </p:txEl>
-                                          </p:spTgt>
-                                        </p:tgtEl>
-                                        <p:attrNameLst>
-                                          <p:attrName>style.visibility</p:attrName>
-                                        </p:attrNameLst>
-                                      </p:cBhvr>
-                                      <p:to>
-                                        <p:strVal val="visible"/>
-                                      </p:to>
-                                    </p:set>
-                                  </p:childTnLst>
-                                </p:cTn>
-                              </p:par>
-                            </p:childTnLst>
-                          </p:cTn>
-                        </p:par>
-                        <p:par>
-                          <p:cTn id="21" fill="hold">
-                            <p:stCondLst>
-                              <p:cond delay="0"/>
-                            </p:stCondLst>
-                            <p:childTnLst>
-                              <p:par>
-                                <p:cTn id="22" presetID="1" presetClass="entr" presetSubtype="0" fill="hold" nodeType="afterEffect">
-                                  <p:stCondLst>
-                                    <p:cond delay="0"/>
-                                  </p:stCondLst>
-                                  <p:childTnLst>
-                                    <p:set>
-                                      <p:cBhvr>
-                                        <p:cTn id="23" dur="1" fill="hold">
-                                          <p:stCondLst>
-                                            <p:cond delay="0"/>
-                                          </p:stCondLst>
-                                        </p:cTn>
-                                        <p:tgtEl>
-                                          <p:spTgt spid="1028"/>
+                                          <p:spTgt spid="6"/>
                                         </p:tgtEl>
                                         <p:attrNameLst>
                                           <p:attrName>style.visibility</p:attrName>
@@ -6060,9 +6742,6 @@
         </p:cTn>
       </p:par>
     </p:tnLst>
-    <p:bldLst>
-      <p:bldP spid="3" grpId="0" uiExpand="1" build="p"/>
-    </p:bldLst>
   </p:timing>
 </p:sld>
 </file>
@@ -6140,6 +6819,160 @@
           </a:p>
           <a:p>
             <a:r>
+              <a:rPr lang="en-US" dirty="0" smtClean="0"/>
+              <a:t>Relationship of M to life history traits</a:t>
+            </a:r>
+          </a:p>
+          <a:p>
+            <a:pPr lvl="1"/>
+            <a:r>
+              <a:rPr lang="en-US" dirty="0" smtClean="0"/>
+              <a:t>See page 217 in IFAR</a:t>
+            </a:r>
+            <a:endParaRPr lang="en-US" dirty="0"/>
+          </a:p>
+        </p:txBody>
+      </p:sp>
+      <p:sp>
+        <p:nvSpPr>
+          <p:cNvPr id="4" name="Footer Placeholder 3"/>
+          <p:cNvSpPr>
+            <a:spLocks noGrp="1"/>
+          </p:cNvSpPr>
+          <p:nvPr>
+            <p:ph type="ftr" sz="quarter" idx="10"/>
+          </p:nvPr>
+        </p:nvSpPr>
+        <p:spPr/>
+        <p:txBody>
+          <a:bodyPr/>
+          <a:lstStyle/>
+          <a:p>
+            <a:r>
+              <a:rPr lang="en-US" smtClean="0"/>
+              <a:t>Catch Curves</a:t>
+            </a:r>
+            <a:endParaRPr lang="en-US"/>
+          </a:p>
+        </p:txBody>
+      </p:sp>
+      <p:sp>
+        <p:nvSpPr>
+          <p:cNvPr id="5" name="Slide Number Placeholder 4"/>
+          <p:cNvSpPr>
+            <a:spLocks noGrp="1"/>
+          </p:cNvSpPr>
+          <p:nvPr>
+            <p:ph type="sldNum" sz="quarter" idx="11"/>
+          </p:nvPr>
+        </p:nvSpPr>
+        <p:spPr/>
+        <p:txBody>
+          <a:bodyPr/>
+          <a:lstStyle/>
+          <a:p>
+            <a:fld id="{CD41EA97-E434-4B42-9B1A-D37266F43B39}" type="slidenum">
+              <a:rPr lang="en-US" smtClean="0"/>
+              <a:pPr/>
+              <a:t>4</a:t>
+            </a:fld>
+            <a:endParaRPr lang="en-US"/>
+          </a:p>
+        </p:txBody>
+      </p:sp>
+    </p:spTree>
+    <p:extLst>
+      <p:ext uri="{BB962C8B-B14F-4D97-AF65-F5344CB8AC3E}">
+        <p14:creationId xmlns:p14="http://schemas.microsoft.com/office/powerpoint/2010/main" val="3695540127"/>
+      </p:ext>
+    </p:extLst>
+  </p:cSld>
+  <p:clrMapOvr>
+    <a:masterClrMapping/>
+  </p:clrMapOvr>
+  <p:timing>
+    <p:tnLst>
+      <p:par>
+        <p:cTn id="1" dur="indefinite" restart="never" nodeType="tmRoot"/>
+      </p:par>
+    </p:tnLst>
+  </p:timing>
+</p:sld>
+</file>
+
+<file path=ppt/slides/slide5.xml><?xml version="1.0" encoding="utf-8"?>
+<p:sld xmlns:a="http://schemas.openxmlformats.org/drawingml/2006/main" xmlns:r="http://schemas.openxmlformats.org/officeDocument/2006/relationships" xmlns:p="http://schemas.openxmlformats.org/presentationml/2006/main">
+  <p:cSld>
+    <p:spTree>
+      <p:nvGrpSpPr>
+        <p:cNvPr id="1" name=""/>
+        <p:cNvGrpSpPr/>
+        <p:nvPr/>
+      </p:nvGrpSpPr>
+      <p:grpSpPr>
+        <a:xfrm>
+          <a:off x="0" y="0"/>
+          <a:ext cx="0" cy="0"/>
+          <a:chOff x="0" y="0"/>
+          <a:chExt cx="0" cy="0"/>
+        </a:xfrm>
+      </p:grpSpPr>
+      <p:sp>
+        <p:nvSpPr>
+          <p:cNvPr id="2" name="Title 1"/>
+          <p:cNvSpPr>
+            <a:spLocks noGrp="1"/>
+          </p:cNvSpPr>
+          <p:nvPr>
+            <p:ph type="title"/>
+          </p:nvPr>
+        </p:nvSpPr>
+        <p:spPr/>
+        <p:txBody>
+          <a:bodyPr/>
+          <a:lstStyle/>
+          <a:p>
+            <a:r>
+              <a:rPr lang="en-US" dirty="0" smtClean="0"/>
+              <a:t>Estimating M</a:t>
+            </a:r>
+            <a:endParaRPr lang="en-US" dirty="0"/>
+          </a:p>
+        </p:txBody>
+      </p:sp>
+      <p:sp>
+        <p:nvSpPr>
+          <p:cNvPr id="3" name="Content Placeholder 2"/>
+          <p:cNvSpPr>
+            <a:spLocks noGrp="1"/>
+          </p:cNvSpPr>
+          <p:nvPr>
+            <p:ph idx="1"/>
+          </p:nvPr>
+        </p:nvSpPr>
+        <p:spPr>
+          <a:xfrm>
+            <a:off x="457200" y="914400"/>
+            <a:ext cx="8229600" cy="5562600"/>
+          </a:xfrm>
+        </p:spPr>
+        <p:txBody>
+          <a:bodyPr/>
+          <a:lstStyle/>
+          <a:p>
+            <a:r>
+              <a:rPr lang="en-US" dirty="0" smtClean="0">
+                <a:solidFill>
+                  <a:schemeClr val="bg1">
+                    <a:lumMod val="75000"/>
+                  </a:schemeClr>
+                </a:solidFill>
+              </a:rPr>
+              <a:t>Assume a constant value for M</a:t>
+            </a:r>
+          </a:p>
+          <a:p>
+            <a:r>
               <a:rPr lang="en-US" dirty="0" smtClean="0">
                 <a:solidFill>
                   <a:schemeClr val="bg1">
@@ -6239,45 +7072,6 @@
               <a:t>0.</a:t>
             </a:r>
           </a:p>
-          <a:p>
-            <a:pPr lvl="2"/>
-            <a:endParaRPr lang="en-US" dirty="0"/>
-          </a:p>
-          <a:p>
-            <a:pPr lvl="1"/>
-            <a:r>
-              <a:rPr lang="en-US" dirty="0" smtClean="0"/>
-              <a:t>f </a:t>
-            </a:r>
-            <a:r>
-              <a:rPr lang="en-US" dirty="0"/>
-              <a:t>and Z </a:t>
-            </a:r>
-            <a:r>
-              <a:rPr lang="en-US" dirty="0" smtClean="0"/>
-              <a:t>estimated over </a:t>
-            </a:r>
-            <a:r>
-              <a:rPr lang="en-US" dirty="0"/>
-              <a:t>a five year period</a:t>
-            </a:r>
-            <a:r>
-              <a:rPr lang="en-US" dirty="0" smtClean="0"/>
-              <a:t>.</a:t>
-            </a:r>
-          </a:p>
-          <a:p>
-            <a:pPr lvl="2"/>
-            <a:r>
-              <a:rPr lang="en-US" dirty="0" smtClean="0"/>
-              <a:t>See handout for estimate of M</a:t>
-            </a:r>
-            <a:endParaRPr lang="en-US" dirty="0"/>
-          </a:p>
-          <a:p>
-            <a:pPr lvl="1"/>
-            <a:endParaRPr lang="en-US" dirty="0"/>
-          </a:p>
         </p:txBody>
       </p:sp>
       <p:sp>
@@ -6321,7 +7115,7 @@
             <a:fld id="{CD41EA97-E434-4B42-9B1A-D37266F43B39}" type="slidenum">
               <a:rPr lang="en-US" smtClean="0"/>
               <a:pPr/>
-              <a:t>4</a:t>
+              <a:t>5</a:t>
             </a:fld>
             <a:endParaRPr lang="en-US"/>
           </a:p>
@@ -6590,35 +7384,398 @@
                       </p:childTnLst>
                     </p:cTn>
                   </p:par>
+                </p:childTnLst>
+              </p:cTn>
+              <p:prevCondLst>
+                <p:cond evt="onPrev" delay="0">
+                  <p:tgtEl>
+                    <p:sldTgt/>
+                  </p:tgtEl>
+                </p:cond>
+              </p:prevCondLst>
+              <p:nextCondLst>
+                <p:cond evt="onNext" delay="0">
+                  <p:tgtEl>
+                    <p:sldTgt/>
+                  </p:tgtEl>
+                </p:cond>
+              </p:nextCondLst>
+            </p:seq>
+          </p:childTnLst>
+        </p:cTn>
+      </p:par>
+    </p:tnLst>
+  </p:timing>
+</p:sld>
+</file>
+
+<file path=ppt/slides/slide6.xml><?xml version="1.0" encoding="utf-8"?>
+<p:sld xmlns:a="http://schemas.openxmlformats.org/drawingml/2006/main" xmlns:r="http://schemas.openxmlformats.org/officeDocument/2006/relationships" xmlns:p="http://schemas.openxmlformats.org/presentationml/2006/main">
+  <p:cSld>
+    <p:spTree>
+      <p:nvGrpSpPr>
+        <p:cNvPr id="1" name=""/>
+        <p:cNvGrpSpPr/>
+        <p:nvPr/>
+      </p:nvGrpSpPr>
+      <p:grpSpPr>
+        <a:xfrm>
+          <a:off x="0" y="0"/>
+          <a:ext cx="0" cy="0"/>
+          <a:chOff x="0" y="0"/>
+          <a:chExt cx="0" cy="0"/>
+        </a:xfrm>
+      </p:grpSpPr>
+      <p:sp>
+        <p:nvSpPr>
+          <p:cNvPr id="2052" name="Rectangle 4"/>
+          <p:cNvSpPr>
+            <a:spLocks noGrp="1" noChangeArrowheads="1"/>
+          </p:cNvSpPr>
+          <p:nvPr>
+            <p:ph type="ctrTitle"/>
+          </p:nvPr>
+        </p:nvSpPr>
+        <p:spPr>
+          <a:xfrm>
+            <a:off x="685800" y="0"/>
+            <a:ext cx="7772400" cy="914400"/>
+          </a:xfrm>
+        </p:spPr>
+        <p:txBody>
+          <a:bodyPr/>
+          <a:lstStyle/>
+          <a:p>
+            <a:r>
+              <a:rPr lang="en-US" dirty="0" smtClean="0"/>
+              <a:t>Controlling F</a:t>
+            </a:r>
+            <a:endParaRPr lang="en-US" sz="3600" dirty="0"/>
+          </a:p>
+        </p:txBody>
+      </p:sp>
+      <p:sp>
+        <p:nvSpPr>
+          <p:cNvPr id="20" name="Rectangle 3"/>
+          <p:cNvSpPr txBox="1">
+            <a:spLocks noChangeArrowheads="1"/>
+          </p:cNvSpPr>
+          <p:nvPr/>
+        </p:nvSpPr>
+        <p:spPr bwMode="auto">
+          <a:xfrm>
+            <a:off x="457200" y="838200"/>
+            <a:ext cx="8382000" cy="5867400"/>
+          </a:xfrm>
+          <a:prstGeom prst="rect">
+            <a:avLst/>
+          </a:prstGeom>
+          <a:noFill/>
+          <a:ln w="9525">
+            <a:noFill/>
+            <a:miter lim="800000"/>
+            <a:headEnd/>
+            <a:tailEnd/>
+          </a:ln>
+          <a:effectLst/>
+        </p:spPr>
+        <p:txBody>
+          <a:bodyPr vert="horz" wrap="square" lIns="91440" tIns="45720" rIns="91440" bIns="45720" numCol="1" anchor="t" anchorCtr="0" compatLnSpc="1">
+            <a:prstTxWarp prst="textNoShape">
+              <a:avLst/>
+            </a:prstTxWarp>
+          </a:bodyPr>
+          <a:lstStyle>
+            <a:lvl1pPr marL="0" indent="0" algn="ctr" rtl="0" fontAlgn="base">
+              <a:spcBef>
+                <a:spcPct val="20000"/>
+              </a:spcBef>
+              <a:spcAft>
+                <a:spcPct val="0"/>
+              </a:spcAft>
+              <a:buNone/>
+              <a:defRPr sz="3200">
+                <a:solidFill>
+                  <a:schemeClr val="tx1"/>
+                </a:solidFill>
+                <a:latin typeface="+mn-lt"/>
+                <a:ea typeface="+mn-ea"/>
+                <a:cs typeface="+mn-cs"/>
+              </a:defRPr>
+            </a:lvl1pPr>
+            <a:lvl2pPr marL="457200" indent="0" algn="ctr" rtl="0" fontAlgn="base">
+              <a:spcBef>
+                <a:spcPct val="20000"/>
+              </a:spcBef>
+              <a:spcAft>
+                <a:spcPct val="0"/>
+              </a:spcAft>
+              <a:buNone/>
+              <a:defRPr sz="2800">
+                <a:solidFill>
+                  <a:schemeClr val="tx1"/>
+                </a:solidFill>
+                <a:latin typeface="+mn-lt"/>
+              </a:defRPr>
+            </a:lvl2pPr>
+            <a:lvl3pPr marL="914400" indent="0" algn="ctr" rtl="0" fontAlgn="base">
+              <a:spcBef>
+                <a:spcPct val="20000"/>
+              </a:spcBef>
+              <a:spcAft>
+                <a:spcPct val="0"/>
+              </a:spcAft>
+              <a:buNone/>
+              <a:defRPr sz="2400">
+                <a:solidFill>
+                  <a:schemeClr val="tx1"/>
+                </a:solidFill>
+                <a:latin typeface="+mn-lt"/>
+              </a:defRPr>
+            </a:lvl3pPr>
+            <a:lvl4pPr marL="1371600" indent="0" algn="ctr" rtl="0" fontAlgn="base">
+              <a:spcBef>
+                <a:spcPct val="20000"/>
+              </a:spcBef>
+              <a:spcAft>
+                <a:spcPct val="0"/>
+              </a:spcAft>
+              <a:buNone/>
+              <a:defRPr sz="2000">
+                <a:solidFill>
+                  <a:schemeClr val="tx1"/>
+                </a:solidFill>
+                <a:latin typeface="+mn-lt"/>
+              </a:defRPr>
+            </a:lvl4pPr>
+            <a:lvl5pPr marL="1828800" indent="0" algn="ctr" rtl="0" fontAlgn="base">
+              <a:spcBef>
+                <a:spcPct val="20000"/>
+              </a:spcBef>
+              <a:spcAft>
+                <a:spcPct val="0"/>
+              </a:spcAft>
+              <a:buNone/>
+              <a:defRPr sz="2000">
+                <a:solidFill>
+                  <a:schemeClr val="tx1"/>
+                </a:solidFill>
+                <a:latin typeface="+mn-lt"/>
+              </a:defRPr>
+            </a:lvl5pPr>
+            <a:lvl6pPr marL="2286000" indent="0" algn="ctr" rtl="0" fontAlgn="base">
+              <a:spcBef>
+                <a:spcPct val="20000"/>
+              </a:spcBef>
+              <a:spcAft>
+                <a:spcPct val="0"/>
+              </a:spcAft>
+              <a:buNone/>
+              <a:defRPr sz="2000">
+                <a:solidFill>
+                  <a:schemeClr val="tx1"/>
+                </a:solidFill>
+                <a:latin typeface="+mn-lt"/>
+              </a:defRPr>
+            </a:lvl6pPr>
+            <a:lvl7pPr marL="2743200" indent="0" algn="ctr" rtl="0" fontAlgn="base">
+              <a:spcBef>
+                <a:spcPct val="20000"/>
+              </a:spcBef>
+              <a:spcAft>
+                <a:spcPct val="0"/>
+              </a:spcAft>
+              <a:buNone/>
+              <a:defRPr sz="2000">
+                <a:solidFill>
+                  <a:schemeClr val="tx1"/>
+                </a:solidFill>
+                <a:latin typeface="+mn-lt"/>
+              </a:defRPr>
+            </a:lvl7pPr>
+            <a:lvl8pPr marL="3200400" indent="0" algn="ctr" rtl="0" fontAlgn="base">
+              <a:spcBef>
+                <a:spcPct val="20000"/>
+              </a:spcBef>
+              <a:spcAft>
+                <a:spcPct val="0"/>
+              </a:spcAft>
+              <a:buNone/>
+              <a:defRPr sz="2000">
+                <a:solidFill>
+                  <a:schemeClr val="tx1"/>
+                </a:solidFill>
+                <a:latin typeface="+mn-lt"/>
+              </a:defRPr>
+            </a:lvl8pPr>
+            <a:lvl9pPr marL="3657600" indent="0" algn="ctr" rtl="0" fontAlgn="base">
+              <a:spcBef>
+                <a:spcPct val="20000"/>
+              </a:spcBef>
+              <a:spcAft>
+                <a:spcPct val="0"/>
+              </a:spcAft>
+              <a:buNone/>
+              <a:defRPr sz="2000">
+                <a:solidFill>
+                  <a:schemeClr val="tx1"/>
+                </a:solidFill>
+                <a:latin typeface="+mn-lt"/>
+              </a:defRPr>
+            </a:lvl9pPr>
+          </a:lstStyle>
+          <a:p>
+            <a:pPr marL="457200" indent="-457200" algn="l">
+              <a:lnSpc>
+                <a:spcPct val="90000"/>
+              </a:lnSpc>
+              <a:buFont typeface="Arial" pitchFamily="34" charset="0"/>
+              <a:buChar char="•"/>
+            </a:pPr>
+            <a:r>
+              <a:rPr lang="en-US" b="0" dirty="0" smtClean="0"/>
+              <a:t>Controlling </a:t>
+            </a:r>
+            <a:r>
+              <a:rPr lang="en-US" b="0" dirty="0" smtClean="0"/>
+              <a:t>F is a major goal of many fisheries management strategies</a:t>
+            </a:r>
+            <a:r>
+              <a:rPr lang="en-US" b="0" dirty="0" smtClean="0"/>
+              <a:t>.</a:t>
+            </a:r>
+            <a:endParaRPr lang="en-US" b="0" dirty="0"/>
+          </a:p>
+          <a:p>
+            <a:pPr marL="457200" indent="-457200" algn="l">
+              <a:lnSpc>
+                <a:spcPct val="90000"/>
+              </a:lnSpc>
+              <a:buFont typeface="Arial" pitchFamily="34" charset="0"/>
+              <a:buChar char="•"/>
+            </a:pPr>
+            <a:endParaRPr lang="en-US" b="0" dirty="0"/>
+          </a:p>
+          <a:p>
+            <a:pPr marL="457200" indent="-457200" algn="l">
+              <a:lnSpc>
+                <a:spcPct val="90000"/>
+              </a:lnSpc>
+              <a:buFont typeface="Arial" pitchFamily="34" charset="0"/>
+              <a:buChar char="•"/>
+            </a:pPr>
+            <a:r>
+              <a:rPr lang="en-US" b="0" dirty="0" smtClean="0"/>
+              <a:t>What happens to Z if F is decreased (i.e., more restrictive harvest regulation)?</a:t>
+            </a:r>
+          </a:p>
+          <a:p>
+            <a:pPr marL="914400" lvl="1" indent="-457200" algn="l">
+              <a:lnSpc>
+                <a:spcPct val="90000"/>
+              </a:lnSpc>
+              <a:buFont typeface="Arial" pitchFamily="34" charset="0"/>
+              <a:buChar char="•"/>
+            </a:pPr>
+            <a:r>
+              <a:rPr lang="en-US" b="0" dirty="0" smtClean="0"/>
+              <a:t>This trade-off of mortalities is called </a:t>
+            </a:r>
+            <a:r>
+              <a:rPr lang="en-US" i="1" dirty="0" smtClean="0"/>
+              <a:t>compensatory mortality</a:t>
+            </a:r>
+            <a:r>
+              <a:rPr lang="en-US" b="0" dirty="0" smtClean="0"/>
+              <a:t>.</a:t>
+            </a:r>
+          </a:p>
+          <a:p>
+            <a:pPr marL="457200" indent="-457200" algn="l">
+              <a:lnSpc>
+                <a:spcPct val="90000"/>
+              </a:lnSpc>
+              <a:buFont typeface="Arial" pitchFamily="34" charset="0"/>
+              <a:buChar char="•"/>
+            </a:pPr>
+            <a:endParaRPr lang="en-US" b="0" dirty="0" smtClean="0"/>
+          </a:p>
+          <a:p>
+            <a:pPr marL="457200" indent="-457200" algn="l">
+              <a:lnSpc>
+                <a:spcPct val="90000"/>
+              </a:lnSpc>
+              <a:buFont typeface="Arial" pitchFamily="34" charset="0"/>
+              <a:buChar char="•"/>
+            </a:pPr>
+            <a:r>
+              <a:rPr lang="en-US" b="0" dirty="0" smtClean="0"/>
+              <a:t>What happens to Z if F is increased (i.e., less restrictive harvest regulation)?</a:t>
+            </a:r>
+          </a:p>
+          <a:p>
+            <a:pPr marL="914400" lvl="1" indent="-457200" algn="l">
+              <a:lnSpc>
+                <a:spcPct val="90000"/>
+              </a:lnSpc>
+              <a:buFont typeface="Arial" pitchFamily="34" charset="0"/>
+              <a:buChar char="•"/>
+            </a:pPr>
+            <a:r>
+              <a:rPr lang="en-US" b="0" dirty="0" smtClean="0"/>
+              <a:t>What also happens to growth, fecundity, etc.?</a:t>
+            </a:r>
+            <a:endParaRPr lang="en-US" b="0" dirty="0" smtClean="0"/>
+          </a:p>
+        </p:txBody>
+      </p:sp>
+    </p:spTree>
+    <p:extLst>
+      <p:ext uri="{BB962C8B-B14F-4D97-AF65-F5344CB8AC3E}">
+        <p14:creationId xmlns:p14="http://schemas.microsoft.com/office/powerpoint/2010/main" val="2701864442"/>
+      </p:ext>
+    </p:extLst>
+  </p:cSld>
+  <p:clrMapOvr>
+    <a:masterClrMapping/>
+  </p:clrMapOvr>
+  <p:timing>
+    <p:tnLst>
+      <p:par>
+        <p:cTn id="1" dur="indefinite" restart="never" nodeType="tmRoot">
+          <p:childTnLst>
+            <p:seq concurrent="1" nextAc="seek">
+              <p:cTn id="2" dur="indefinite" nodeType="mainSeq">
+                <p:childTnLst>
                   <p:par>
-                    <p:cTn id="23" fill="hold">
+                    <p:cTn id="3" fill="hold">
                       <p:stCondLst>
                         <p:cond delay="indefinite"/>
                       </p:stCondLst>
                       <p:childTnLst>
                         <p:par>
-                          <p:cTn id="24" fill="hold">
+                          <p:cTn id="4" fill="hold">
                             <p:stCondLst>
                               <p:cond delay="0"/>
                             </p:stCondLst>
                             <p:childTnLst>
                               <p:par>
-                                <p:cTn id="25" presetID="1" presetClass="entr" presetSubtype="0" fill="hold" nodeType="clickEffect">
+                                <p:cTn id="5" presetID="1" presetClass="entr" presetSubtype="0" fill="hold" grpId="0" nodeType="clickEffect">
                                   <p:stCondLst>
                                     <p:cond delay="0"/>
                                   </p:stCondLst>
                                   <p:childTnLst>
                                     <p:set>
                                       <p:cBhvr>
-                                        <p:cTn id="26" dur="1" fill="hold">
+                                        <p:cTn id="6" dur="1" fill="hold">
                                           <p:stCondLst>
                                             <p:cond delay="0"/>
                                           </p:stCondLst>
                                         </p:cTn>
                                         <p:tgtEl>
-                                          <p:spTgt spid="3">
+                                          <p:spTgt spid="20">
                                             <p:txEl>
-                                              <p:pRg st="9" end="9"/>
+                                              <p:pRg st="2" end="2"/>
                                             </p:txEl>
                                           </p:spTgt>
                                         </p:tgtEl>
@@ -6636,29 +7793,136 @@
                             </p:childTnLst>
                           </p:cTn>
                         </p:par>
+                      </p:childTnLst>
+                    </p:cTn>
+                  </p:par>
+                  <p:par>
+                    <p:cTn id="7" fill="hold">
+                      <p:stCondLst>
+                        <p:cond delay="indefinite"/>
+                      </p:stCondLst>
+                      <p:childTnLst>
                         <p:par>
-                          <p:cTn id="27" fill="hold">
+                          <p:cTn id="8" fill="hold">
                             <p:stCondLst>
                               <p:cond delay="0"/>
                             </p:stCondLst>
                             <p:childTnLst>
                               <p:par>
-                                <p:cTn id="28" presetID="1" presetClass="entr" presetSubtype="0" fill="hold" nodeType="afterEffect">
+                                <p:cTn id="9" presetID="1" presetClass="entr" presetSubtype="0" fill="hold" grpId="0" nodeType="clickEffect">
                                   <p:stCondLst>
                                     <p:cond delay="0"/>
                                   </p:stCondLst>
                                   <p:childTnLst>
                                     <p:set>
                                       <p:cBhvr>
-                                        <p:cTn id="29" dur="1" fill="hold">
+                                        <p:cTn id="10" dur="1" fill="hold">
                                           <p:stCondLst>
                                             <p:cond delay="0"/>
                                           </p:stCondLst>
                                         </p:cTn>
                                         <p:tgtEl>
-                                          <p:spTgt spid="3">
+                                          <p:spTgt spid="20">
                                             <p:txEl>
-                                              <p:pRg st="10" end="10"/>
+                                              <p:pRg st="3" end="3"/>
+                                            </p:txEl>
+                                          </p:spTgt>
+                                        </p:tgtEl>
+                                        <p:attrNameLst>
+                                          <p:attrName>style.visibility</p:attrName>
+                                        </p:attrNameLst>
+                                      </p:cBhvr>
+                                      <p:to>
+                                        <p:strVal val="visible"/>
+                                      </p:to>
+                                    </p:set>
+                                  </p:childTnLst>
+                                </p:cTn>
+                              </p:par>
+                            </p:childTnLst>
+                          </p:cTn>
+                        </p:par>
+                      </p:childTnLst>
+                    </p:cTn>
+                  </p:par>
+                  <p:par>
+                    <p:cTn id="11" fill="hold">
+                      <p:stCondLst>
+                        <p:cond delay="indefinite"/>
+                      </p:stCondLst>
+                      <p:childTnLst>
+                        <p:par>
+                          <p:cTn id="12" fill="hold">
+                            <p:stCondLst>
+                              <p:cond delay="0"/>
+                            </p:stCondLst>
+                            <p:childTnLst>
+                              <p:par>
+                                <p:cTn id="13" presetID="1" presetClass="entr" presetSubtype="0" fill="hold" grpId="0" nodeType="clickEffect">
+                                  <p:stCondLst>
+                                    <p:cond delay="0"/>
+                                  </p:stCondLst>
+                                  <p:childTnLst>
+                                    <p:set>
+                                      <p:cBhvr>
+                                        <p:cTn id="14" dur="1" fill="hold">
+                                          <p:stCondLst>
+                                            <p:cond delay="0"/>
+                                          </p:stCondLst>
+                                        </p:cTn>
+                                        <p:tgtEl>
+                                          <p:spTgt spid="20">
+                                            <p:txEl>
+                                              <p:pRg st="5" end="5"/>
+                                            </p:txEl>
+                                          </p:spTgt>
+                                        </p:tgtEl>
+                                        <p:attrNameLst>
+                                          <p:attrName>style.visibility</p:attrName>
+                                        </p:attrNameLst>
+                                      </p:cBhvr>
+                                      <p:to>
+                                        <p:strVal val="visible"/>
+                                      </p:to>
+                                    </p:set>
+                                  </p:childTnLst>
+                                </p:cTn>
+                              </p:par>
+                            </p:childTnLst>
+                          </p:cTn>
+                        </p:par>
+                      </p:childTnLst>
+                    </p:cTn>
+                  </p:par>
+                  <p:par>
+                    <p:cTn id="15" fill="hold">
+                      <p:stCondLst>
+                        <p:cond delay="indefinite"/>
+                      </p:stCondLst>
+                      <p:childTnLst>
+                        <p:par>
+                          <p:cTn id="16" fill="hold">
+                            <p:stCondLst>
+                              <p:cond delay="0"/>
+                            </p:stCondLst>
+                            <p:childTnLst>
+                              <p:par>
+                                <p:cTn id="17" presetID="1" presetClass="entr" presetSubtype="0" fill="hold" grpId="0" nodeType="clickEffect">
+                                  <p:stCondLst>
+                                    <p:cond delay="0"/>
+                                  </p:stCondLst>
+                                  <p:childTnLst>
+                                    <p:set>
+                                      <p:cBhvr>
+                                        <p:cTn id="18" dur="1" fill="hold">
+                                          <p:stCondLst>
+                                            <p:cond delay="0"/>
+                                          </p:stCondLst>
+                                        </p:cTn>
+                                        <p:tgtEl>
+                                          <p:spTgt spid="20">
+                                            <p:txEl>
+                                              <p:pRg st="6" end="6"/>
                                             </p:txEl>
                                           </p:spTgt>
                                         </p:tgtEl>
@@ -6700,11 +7964,14 @@
         </p:cTn>
       </p:par>
     </p:tnLst>
+    <p:bldLst>
+      <p:bldP spid="20" grpId="0" uiExpand="1" build="p"/>
+    </p:bldLst>
   </p:timing>
 </p:sld>
 </file>
 
-<file path=ppt/slides/slide5.xml><?xml version="1.0" encoding="utf-8"?>
+<file path=ppt/slides/slide7.xml><?xml version="1.0" encoding="utf-8"?>
 <p:sld xmlns:a="http://schemas.openxmlformats.org/drawingml/2006/main" xmlns:r="http://schemas.openxmlformats.org/officeDocument/2006/relationships" xmlns:p="http://schemas.openxmlformats.org/presentationml/2006/main">
   <p:cSld>
     <p:spTree>
@@ -6723,6 +7990,121 @@
       </p:grpSpPr>
       <p:sp>
         <p:nvSpPr>
+          <p:cNvPr id="2" name="Title 1"/>
+          <p:cNvSpPr>
+            <a:spLocks noGrp="1"/>
+          </p:cNvSpPr>
+          <p:nvPr>
+            <p:ph type="title"/>
+          </p:nvPr>
+        </p:nvSpPr>
+        <p:spPr/>
+        <p:txBody>
+          <a:bodyPr/>
+          <a:lstStyle/>
+          <a:p>
+            <a:endParaRPr lang="en-US"/>
+          </a:p>
+        </p:txBody>
+      </p:sp>
+      <p:sp>
+        <p:nvSpPr>
+          <p:cNvPr id="3" name="Content Placeholder 2"/>
+          <p:cNvSpPr>
+            <a:spLocks noGrp="1"/>
+          </p:cNvSpPr>
+          <p:nvPr>
+            <p:ph idx="1"/>
+          </p:nvPr>
+        </p:nvSpPr>
+        <p:spPr/>
+        <p:txBody>
+          <a:bodyPr/>
+          <a:lstStyle/>
+          <a:p>
+            <a:endParaRPr lang="en-US"/>
+          </a:p>
+        </p:txBody>
+      </p:sp>
+      <p:sp>
+        <p:nvSpPr>
+          <p:cNvPr id="4" name="Footer Placeholder 3"/>
+          <p:cNvSpPr>
+            <a:spLocks noGrp="1"/>
+          </p:cNvSpPr>
+          <p:nvPr>
+            <p:ph type="ftr" sz="quarter" idx="10"/>
+          </p:nvPr>
+        </p:nvSpPr>
+        <p:spPr/>
+        <p:txBody>
+          <a:bodyPr/>
+          <a:lstStyle/>
+          <a:p>
+            <a:r>
+              <a:rPr lang="en-US" smtClean="0"/>
+              <a:t>Catch Curves</a:t>
+            </a:r>
+            <a:endParaRPr lang="en-US"/>
+          </a:p>
+        </p:txBody>
+      </p:sp>
+      <p:sp>
+        <p:nvSpPr>
+          <p:cNvPr id="5" name="Slide Number Placeholder 4"/>
+          <p:cNvSpPr>
+            <a:spLocks noGrp="1"/>
+          </p:cNvSpPr>
+          <p:nvPr>
+            <p:ph type="sldNum" sz="quarter" idx="11"/>
+          </p:nvPr>
+        </p:nvSpPr>
+        <p:spPr/>
+        <p:txBody>
+          <a:bodyPr/>
+          <a:lstStyle/>
+          <a:p>
+            <a:fld id="{CD41EA97-E434-4B42-9B1A-D37266F43B39}" type="slidenum">
+              <a:rPr lang="en-US" smtClean="0"/>
+              <a:pPr/>
+              <a:t>7</a:t>
+            </a:fld>
+            <a:endParaRPr lang="en-US"/>
+          </a:p>
+        </p:txBody>
+      </p:sp>
+    </p:spTree>
+    <p:extLst>
+      <p:ext uri="{BB962C8B-B14F-4D97-AF65-F5344CB8AC3E}">
+        <p14:creationId xmlns:p14="http://schemas.microsoft.com/office/powerpoint/2010/main" val="1179837800"/>
+      </p:ext>
+    </p:extLst>
+  </p:cSld>
+  <p:clrMapOvr>
+    <a:masterClrMapping/>
+  </p:clrMapOvr>
+</p:sld>
+</file>
+
+<file path=ppt/slides/slide8.xml><?xml version="1.0" encoding="utf-8"?>
+<p:sld xmlns:a="http://schemas.openxmlformats.org/drawingml/2006/main" xmlns:r="http://schemas.openxmlformats.org/officeDocument/2006/relationships" xmlns:p="http://schemas.openxmlformats.org/presentationml/2006/main">
+  <p:cSld>
+    <p:spTree>
+      <p:nvGrpSpPr>
+        <p:cNvPr id="1" name=""/>
+        <p:cNvGrpSpPr/>
+        <p:nvPr/>
+      </p:nvGrpSpPr>
+      <p:grpSpPr>
+        <a:xfrm>
+          <a:off x="0" y="0"/>
+          <a:ext cx="0" cy="0"/>
+          <a:chOff x="0" y="0"/>
+          <a:chExt cx="0" cy="0"/>
+        </a:xfrm>
+      </p:grpSpPr>
+      <p:sp>
+        <p:nvSpPr>
           <p:cNvPr id="9" name="Footer Placeholder 3"/>
           <p:cNvSpPr>
             <a:spLocks noGrp="1"/>
@@ -6761,7 +8143,7 @@
             <a:fld id="{170A5CBA-EE77-45C6-A259-18D0A0F85CCA}" type="slidenum">
               <a:rPr lang="en-US"/>
               <a:pPr/>
-              <a:t>5</a:t>
+              <a:t>8</a:t>
             </a:fld>
             <a:endParaRPr lang="en-US"/>
           </a:p>
@@ -7317,7 +8699,7 @@
 </p:sld>
 </file>
 
-<file path=ppt/slides/slide6.xml><?xml version="1.0" encoding="utf-8"?>
+<file path=ppt/slides/slide9.xml><?xml version="1.0" encoding="utf-8"?>
 <p:sld xmlns:a="http://schemas.openxmlformats.org/drawingml/2006/main" xmlns:r="http://schemas.openxmlformats.org/officeDocument/2006/relationships" xmlns:p="http://schemas.openxmlformats.org/presentationml/2006/main">
   <p:cSld>
     <p:spTree>
@@ -7374,7 +8756,7 @@
             <a:fld id="{D7A0E3EA-0C36-40CC-B5D8-9DE7525091DC}" type="slidenum">
               <a:rPr lang="en-US"/>
               <a:pPr/>
-              <a:t>6</a:t>
+              <a:t>9</a:t>
             </a:fld>
             <a:endParaRPr lang="en-US"/>
           </a:p>
@@ -7841,836 +9223,6 @@
     </p:tnLst>
     <p:bldLst>
       <p:bldP spid="424963" grpId="0" build="p"/>
-    </p:bldLst>
-  </p:timing>
-</p:sld>
-</file>
-
-<file path=ppt/slides/slide7.xml><?xml version="1.0" encoding="utf-8"?>
-<p:sld xmlns:a="http://schemas.openxmlformats.org/drawingml/2006/main" xmlns:r="http://schemas.openxmlformats.org/officeDocument/2006/relationships" xmlns:p="http://schemas.openxmlformats.org/presentationml/2006/main">
-  <p:cSld>
-    <p:spTree>
-      <p:nvGrpSpPr>
-        <p:cNvPr id="1" name=""/>
-        <p:cNvGrpSpPr/>
-        <p:nvPr/>
-      </p:nvGrpSpPr>
-      <p:grpSpPr>
-        <a:xfrm>
-          <a:off x="0" y="0"/>
-          <a:ext cx="0" cy="0"/>
-          <a:chOff x="0" y="0"/>
-          <a:chExt cx="0" cy="0"/>
-        </a:xfrm>
-      </p:grpSpPr>
-      <p:sp>
-        <p:nvSpPr>
-          <p:cNvPr id="7" name="Footer Placeholder 3"/>
-          <p:cNvSpPr>
-            <a:spLocks noGrp="1"/>
-          </p:cNvSpPr>
-          <p:nvPr>
-            <p:ph type="ftr" sz="quarter" idx="10"/>
-          </p:nvPr>
-        </p:nvSpPr>
-        <p:spPr/>
-        <p:txBody>
-          <a:bodyPr/>
-          <a:lstStyle/>
-          <a:p>
-            <a:r>
-              <a:rPr lang="en-US"/>
-              <a:t>Catch Curves</a:t>
-            </a:r>
-          </a:p>
-        </p:txBody>
-      </p:sp>
-      <p:sp>
-        <p:nvSpPr>
-          <p:cNvPr id="8" name="Slide Number Placeholder 4"/>
-          <p:cNvSpPr>
-            <a:spLocks noGrp="1"/>
-          </p:cNvSpPr>
-          <p:nvPr>
-            <p:ph type="sldNum" sz="quarter" idx="11"/>
-          </p:nvPr>
-        </p:nvSpPr>
-        <p:spPr/>
-        <p:txBody>
-          <a:bodyPr/>
-          <a:lstStyle/>
-          <a:p>
-            <a:fld id="{2718A24F-E62C-4120-B0DD-8B7B1D480092}" type="slidenum">
-              <a:rPr lang="en-US"/>
-              <a:pPr/>
-              <a:t>7</a:t>
-            </a:fld>
-            <a:endParaRPr lang="en-US"/>
-          </a:p>
-        </p:txBody>
-      </p:sp>
-      <p:sp>
-        <p:nvSpPr>
-          <p:cNvPr id="425986" name="Rectangle 2"/>
-          <p:cNvSpPr>
-            <a:spLocks noGrp="1" noChangeArrowheads="1"/>
-          </p:cNvSpPr>
-          <p:nvPr>
-            <p:ph type="title"/>
-          </p:nvPr>
-        </p:nvSpPr>
-        <p:spPr/>
-        <p:txBody>
-          <a:bodyPr/>
-          <a:lstStyle/>
-          <a:p>
-            <a:r>
-              <a:rPr lang="en-US"/>
-              <a:t>Estimating F with Marked Fish</a:t>
-            </a:r>
-          </a:p>
-        </p:txBody>
-      </p:sp>
-      <p:sp>
-        <p:nvSpPr>
-          <p:cNvPr id="425987" name="Rectangle 3"/>
-          <p:cNvSpPr>
-            <a:spLocks noGrp="1" noChangeArrowheads="1"/>
-          </p:cNvSpPr>
-          <p:nvPr>
-            <p:ph type="body" idx="1"/>
-          </p:nvPr>
-        </p:nvSpPr>
-        <p:spPr>
-          <a:xfrm>
-            <a:off x="457200" y="2438400"/>
-            <a:ext cx="8458200" cy="4038600"/>
-          </a:xfrm>
-        </p:spPr>
-        <p:txBody>
-          <a:bodyPr/>
-          <a:lstStyle/>
-          <a:p>
-            <a:r>
-              <a:rPr lang="en-US"/>
-              <a:t>Examine this model closely …</a:t>
-            </a:r>
-          </a:p>
-          <a:p>
-            <a:pPr lvl="1"/>
-            <a:r>
-              <a:rPr lang="en-US"/>
-              <a:t>Slope is an estimate of –Z</a:t>
-            </a:r>
-          </a:p>
-          <a:p>
-            <a:pPr lvl="1"/>
-            <a:endParaRPr lang="en-US" sz="1400"/>
-          </a:p>
-          <a:p>
-            <a:pPr lvl="1"/>
-            <a:r>
-              <a:rPr lang="en-US"/>
-              <a:t>Intercept is an estimate of …</a:t>
-            </a:r>
-          </a:p>
-          <a:p>
-            <a:pPr lvl="1"/>
-            <a:endParaRPr lang="en-US" sz="1600"/>
-          </a:p>
-          <a:p>
-            <a:pPr lvl="1"/>
-            <a:r>
-              <a:rPr lang="en-US"/>
-              <a:t>Which can be solved for F</a:t>
-            </a:r>
-          </a:p>
-        </p:txBody>
-      </p:sp>
-      <p:pic>
-        <p:nvPicPr>
-          <p:cNvPr id="425988" name="Picture 4"/>
-          <p:cNvPicPr>
-            <a:picLocks noChangeAspect="1" noChangeArrowheads="1"/>
-          </p:cNvPicPr>
-          <p:nvPr/>
-        </p:nvPicPr>
-        <p:blipFill>
-          <a:blip r:embed="rId2"/>
-          <a:srcRect/>
-          <a:stretch>
-            <a:fillRect/>
-          </a:stretch>
-        </p:blipFill>
-        <p:spPr bwMode="auto">
-          <a:xfrm>
-            <a:off x="1066800" y="1066800"/>
-            <a:ext cx="6875463" cy="1228725"/>
-          </a:xfrm>
-          <a:prstGeom prst="rect">
-            <a:avLst/>
-          </a:prstGeom>
-          <a:noFill/>
-          <a:ln w="9525">
-            <a:noFill/>
-            <a:miter lim="800000"/>
-            <a:headEnd/>
-            <a:tailEnd/>
-          </a:ln>
-          <a:effectLst/>
-        </p:spPr>
-      </p:pic>
-      <p:pic>
-        <p:nvPicPr>
-          <p:cNvPr id="425989" name="Picture 5"/>
-          <p:cNvPicPr>
-            <a:picLocks noChangeAspect="1" noChangeArrowheads="1"/>
-          </p:cNvPicPr>
-          <p:nvPr/>
-        </p:nvPicPr>
-        <p:blipFill>
-          <a:blip r:embed="rId3"/>
-          <a:srcRect/>
-          <a:stretch>
-            <a:fillRect/>
-          </a:stretch>
-        </p:blipFill>
-        <p:spPr bwMode="auto">
-          <a:xfrm>
-            <a:off x="2709863" y="5257800"/>
-            <a:ext cx="3724275" cy="1209675"/>
-          </a:xfrm>
-          <a:prstGeom prst="rect">
-            <a:avLst/>
-          </a:prstGeom>
-          <a:noFill/>
-          <a:ln w="9525">
-            <a:noFill/>
-            <a:miter lim="800000"/>
-            <a:headEnd/>
-            <a:tailEnd/>
-          </a:ln>
-          <a:effectLst/>
-        </p:spPr>
-      </p:pic>
-      <p:pic>
-        <p:nvPicPr>
-          <p:cNvPr id="425990" name="Picture 6"/>
-          <p:cNvPicPr>
-            <a:picLocks noChangeAspect="1" noChangeArrowheads="1"/>
-          </p:cNvPicPr>
-          <p:nvPr/>
-        </p:nvPicPr>
-        <p:blipFill>
-          <a:blip r:embed="rId4"/>
-          <a:srcRect/>
-          <a:stretch>
-            <a:fillRect/>
-          </a:stretch>
-        </p:blipFill>
-        <p:spPr bwMode="auto">
-          <a:xfrm>
-            <a:off x="5486400" y="3505200"/>
-            <a:ext cx="3581400" cy="1098550"/>
-          </a:xfrm>
-          <a:prstGeom prst="rect">
-            <a:avLst/>
-          </a:prstGeom>
-          <a:noFill/>
-          <a:ln w="9525">
-            <a:noFill/>
-            <a:miter lim="800000"/>
-            <a:headEnd/>
-            <a:tailEnd/>
-          </a:ln>
-          <a:effectLst/>
-        </p:spPr>
-      </p:pic>
-    </p:spTree>
-  </p:cSld>
-  <p:clrMapOvr>
-    <a:masterClrMapping/>
-  </p:clrMapOvr>
-  <p:timing>
-    <p:tnLst>
-      <p:par>
-        <p:cTn id="1" dur="indefinite" restart="never" nodeType="tmRoot">
-          <p:childTnLst>
-            <p:seq concurrent="1" nextAc="seek">
-              <p:cTn id="2" dur="indefinite" nodeType="mainSeq">
-                <p:childTnLst>
-                  <p:par>
-                    <p:cTn id="3" fill="hold">
-                      <p:stCondLst>
-                        <p:cond delay="indefinite"/>
-                      </p:stCondLst>
-                      <p:childTnLst>
-                        <p:par>
-                          <p:cTn id="4" fill="hold">
-                            <p:stCondLst>
-                              <p:cond delay="0"/>
-                            </p:stCondLst>
-                            <p:childTnLst>
-                              <p:par>
-                                <p:cTn id="5" presetID="1" presetClass="entr" presetSubtype="0" fill="hold" grpId="0" nodeType="clickEffect">
-                                  <p:stCondLst>
-                                    <p:cond delay="0"/>
-                                  </p:stCondLst>
-                                  <p:childTnLst>
-                                    <p:set>
-                                      <p:cBhvr>
-                                        <p:cTn id="6" dur="1" fill="hold">
-                                          <p:stCondLst>
-                                            <p:cond delay="0"/>
-                                          </p:stCondLst>
-                                        </p:cTn>
-                                        <p:tgtEl>
-                                          <p:spTgt spid="425987">
-                                            <p:txEl>
-                                              <p:pRg st="1" end="1"/>
-                                            </p:txEl>
-                                          </p:spTgt>
-                                        </p:tgtEl>
-                                        <p:attrNameLst>
-                                          <p:attrName>style.visibility</p:attrName>
-                                        </p:attrNameLst>
-                                      </p:cBhvr>
-                                      <p:to>
-                                        <p:strVal val="visible"/>
-                                      </p:to>
-                                    </p:set>
-                                  </p:childTnLst>
-                                </p:cTn>
-                              </p:par>
-                            </p:childTnLst>
-                          </p:cTn>
-                        </p:par>
-                      </p:childTnLst>
-                    </p:cTn>
-                  </p:par>
-                  <p:par>
-                    <p:cTn id="7" fill="hold">
-                      <p:stCondLst>
-                        <p:cond delay="indefinite"/>
-                      </p:stCondLst>
-                      <p:childTnLst>
-                        <p:par>
-                          <p:cTn id="8" fill="hold">
-                            <p:stCondLst>
-                              <p:cond delay="0"/>
-                            </p:stCondLst>
-                            <p:childTnLst>
-                              <p:par>
-                                <p:cTn id="9" presetID="1" presetClass="entr" presetSubtype="0" fill="hold" grpId="0" nodeType="clickEffect">
-                                  <p:stCondLst>
-                                    <p:cond delay="0"/>
-                                  </p:stCondLst>
-                                  <p:childTnLst>
-                                    <p:set>
-                                      <p:cBhvr>
-                                        <p:cTn id="10" dur="1" fill="hold">
-                                          <p:stCondLst>
-                                            <p:cond delay="0"/>
-                                          </p:stCondLst>
-                                        </p:cTn>
-                                        <p:tgtEl>
-                                          <p:spTgt spid="425987">
-                                            <p:txEl>
-                                              <p:pRg st="3" end="3"/>
-                                            </p:txEl>
-                                          </p:spTgt>
-                                        </p:tgtEl>
-                                        <p:attrNameLst>
-                                          <p:attrName>style.visibility</p:attrName>
-                                        </p:attrNameLst>
-                                      </p:cBhvr>
-                                      <p:to>
-                                        <p:strVal val="visible"/>
-                                      </p:to>
-                                    </p:set>
-                                  </p:childTnLst>
-                                </p:cTn>
-                              </p:par>
-                              <p:par>
-                                <p:cTn id="11" presetID="1" presetClass="entr" presetSubtype="0" fill="hold" nodeType="withEffect">
-                                  <p:stCondLst>
-                                    <p:cond delay="0"/>
-                                  </p:stCondLst>
-                                  <p:childTnLst>
-                                    <p:set>
-                                      <p:cBhvr>
-                                        <p:cTn id="12" dur="1" fill="hold">
-                                          <p:stCondLst>
-                                            <p:cond delay="0"/>
-                                          </p:stCondLst>
-                                        </p:cTn>
-                                        <p:tgtEl>
-                                          <p:spTgt spid="425990"/>
-                                        </p:tgtEl>
-                                        <p:attrNameLst>
-                                          <p:attrName>style.visibility</p:attrName>
-                                        </p:attrNameLst>
-                                      </p:cBhvr>
-                                      <p:to>
-                                        <p:strVal val="visible"/>
-                                      </p:to>
-                                    </p:set>
-                                  </p:childTnLst>
-                                </p:cTn>
-                              </p:par>
-                            </p:childTnLst>
-                          </p:cTn>
-                        </p:par>
-                      </p:childTnLst>
-                    </p:cTn>
-                  </p:par>
-                  <p:par>
-                    <p:cTn id="13" fill="hold">
-                      <p:stCondLst>
-                        <p:cond delay="indefinite"/>
-                      </p:stCondLst>
-                      <p:childTnLst>
-                        <p:par>
-                          <p:cTn id="14" fill="hold">
-                            <p:stCondLst>
-                              <p:cond delay="0"/>
-                            </p:stCondLst>
-                            <p:childTnLst>
-                              <p:par>
-                                <p:cTn id="15" presetID="1" presetClass="entr" presetSubtype="0" fill="hold" grpId="0" nodeType="clickEffect">
-                                  <p:stCondLst>
-                                    <p:cond delay="0"/>
-                                  </p:stCondLst>
-                                  <p:childTnLst>
-                                    <p:set>
-                                      <p:cBhvr>
-                                        <p:cTn id="16" dur="1" fill="hold">
-                                          <p:stCondLst>
-                                            <p:cond delay="0"/>
-                                          </p:stCondLst>
-                                        </p:cTn>
-                                        <p:tgtEl>
-                                          <p:spTgt spid="425987">
-                                            <p:txEl>
-                                              <p:pRg st="5" end="5"/>
-                                            </p:txEl>
-                                          </p:spTgt>
-                                        </p:tgtEl>
-                                        <p:attrNameLst>
-                                          <p:attrName>style.visibility</p:attrName>
-                                        </p:attrNameLst>
-                                      </p:cBhvr>
-                                      <p:to>
-                                        <p:strVal val="visible"/>
-                                      </p:to>
-                                    </p:set>
-                                  </p:childTnLst>
-                                </p:cTn>
-                              </p:par>
-                            </p:childTnLst>
-                          </p:cTn>
-                        </p:par>
-                      </p:childTnLst>
-                    </p:cTn>
-                  </p:par>
-                  <p:par>
-                    <p:cTn id="17" fill="hold">
-                      <p:stCondLst>
-                        <p:cond delay="indefinite"/>
-                      </p:stCondLst>
-                      <p:childTnLst>
-                        <p:par>
-                          <p:cTn id="18" fill="hold">
-                            <p:stCondLst>
-                              <p:cond delay="0"/>
-                            </p:stCondLst>
-                            <p:childTnLst>
-                              <p:par>
-                                <p:cTn id="19" presetID="9" presetClass="entr" presetSubtype="0" fill="hold" nodeType="clickEffect">
-                                  <p:stCondLst>
-                                    <p:cond delay="0"/>
-                                  </p:stCondLst>
-                                  <p:childTnLst>
-                                    <p:set>
-                                      <p:cBhvr>
-                                        <p:cTn id="20" dur="1" fill="hold">
-                                          <p:stCondLst>
-                                            <p:cond delay="0"/>
-                                          </p:stCondLst>
-                                        </p:cTn>
-                                        <p:tgtEl>
-                                          <p:spTgt spid="425989"/>
-                                        </p:tgtEl>
-                                        <p:attrNameLst>
-                                          <p:attrName>style.visibility</p:attrName>
-                                        </p:attrNameLst>
-                                      </p:cBhvr>
-                                      <p:to>
-                                        <p:strVal val="visible"/>
-                                      </p:to>
-                                    </p:set>
-                                    <p:animEffect transition="in" filter="dissolve">
-                                      <p:cBhvr>
-                                        <p:cTn id="21" dur="500"/>
-                                        <p:tgtEl>
-                                          <p:spTgt spid="425989"/>
-                                        </p:tgtEl>
-                                      </p:cBhvr>
-                                    </p:animEffect>
-                                  </p:childTnLst>
-                                </p:cTn>
-                              </p:par>
-                            </p:childTnLst>
-                          </p:cTn>
-                        </p:par>
-                      </p:childTnLst>
-                    </p:cTn>
-                  </p:par>
-                </p:childTnLst>
-              </p:cTn>
-              <p:prevCondLst>
-                <p:cond evt="onPrev" delay="0">
-                  <p:tgtEl>
-                    <p:sldTgt/>
-                  </p:tgtEl>
-                </p:cond>
-              </p:prevCondLst>
-              <p:nextCondLst>
-                <p:cond evt="onNext" delay="0">
-                  <p:tgtEl>
-                    <p:sldTgt/>
-                  </p:tgtEl>
-                </p:cond>
-              </p:nextCondLst>
-            </p:seq>
-          </p:childTnLst>
-        </p:cTn>
-      </p:par>
-    </p:tnLst>
-    <p:bldLst>
-      <p:bldP spid="425987" grpId="0" build="p"/>
-    </p:bldLst>
-  </p:timing>
-</p:sld>
-</file>
-
-<file path=ppt/slides/slide8.xml><?xml version="1.0" encoding="utf-8"?>
-<p:sld xmlns:a="http://schemas.openxmlformats.org/drawingml/2006/main" xmlns:r="http://schemas.openxmlformats.org/officeDocument/2006/relationships" xmlns:p="http://schemas.openxmlformats.org/presentationml/2006/main">
-  <p:cSld>
-    <p:spTree>
-      <p:nvGrpSpPr>
-        <p:cNvPr id="1" name=""/>
-        <p:cNvGrpSpPr/>
-        <p:nvPr/>
-      </p:nvGrpSpPr>
-      <p:grpSpPr>
-        <a:xfrm>
-          <a:off x="0" y="0"/>
-          <a:ext cx="0" cy="0"/>
-          <a:chOff x="0" y="0"/>
-          <a:chExt cx="0" cy="0"/>
-        </a:xfrm>
-      </p:grpSpPr>
-      <p:sp>
-        <p:nvSpPr>
-          <p:cNvPr id="4" name="Footer Placeholder 3"/>
-          <p:cNvSpPr>
-            <a:spLocks noGrp="1"/>
-          </p:cNvSpPr>
-          <p:nvPr>
-            <p:ph type="ftr" sz="quarter" idx="10"/>
-          </p:nvPr>
-        </p:nvSpPr>
-        <p:spPr/>
-        <p:txBody>
-          <a:bodyPr/>
-          <a:lstStyle/>
-          <a:p>
-            <a:r>
-              <a:rPr lang="en-US"/>
-              <a:t>Catch Curves</a:t>
-            </a:r>
-          </a:p>
-        </p:txBody>
-      </p:sp>
-      <p:sp>
-        <p:nvSpPr>
-          <p:cNvPr id="5" name="Slide Number Placeholder 4"/>
-          <p:cNvSpPr>
-            <a:spLocks noGrp="1"/>
-          </p:cNvSpPr>
-          <p:nvPr>
-            <p:ph type="sldNum" sz="quarter" idx="11"/>
-          </p:nvPr>
-        </p:nvSpPr>
-        <p:spPr/>
-        <p:txBody>
-          <a:bodyPr/>
-          <a:lstStyle/>
-          <a:p>
-            <a:fld id="{319D3E82-01FD-44E5-B41C-C049F4B3AA45}" type="slidenum">
-              <a:rPr lang="en-US"/>
-              <a:pPr/>
-              <a:t>8</a:t>
-            </a:fld>
-            <a:endParaRPr lang="en-US"/>
-          </a:p>
-        </p:txBody>
-      </p:sp>
-      <p:sp>
-        <p:nvSpPr>
-          <p:cNvPr id="427010" name="Rectangle 2"/>
-          <p:cNvSpPr>
-            <a:spLocks noGrp="1" noChangeArrowheads="1"/>
-          </p:cNvSpPr>
-          <p:nvPr>
-            <p:ph type="title"/>
-          </p:nvPr>
-        </p:nvSpPr>
-        <p:spPr/>
-        <p:txBody>
-          <a:bodyPr/>
-          <a:lstStyle/>
-          <a:p>
-            <a:r>
-              <a:rPr lang="en-US"/>
-              <a:t>Example</a:t>
-            </a:r>
-          </a:p>
-        </p:txBody>
-      </p:sp>
-      <p:sp>
-        <p:nvSpPr>
-          <p:cNvPr id="427011" name="Rectangle 3"/>
-          <p:cNvSpPr>
-            <a:spLocks noGrp="1" noChangeArrowheads="1"/>
-          </p:cNvSpPr>
-          <p:nvPr>
-            <p:ph type="body" idx="1"/>
-          </p:nvPr>
-        </p:nvSpPr>
-        <p:spPr>
-          <a:xfrm>
-            <a:off x="457200" y="1143000"/>
-            <a:ext cx="8534400" cy="5334000"/>
-          </a:xfrm>
-        </p:spPr>
-        <p:txBody>
-          <a:bodyPr/>
-          <a:lstStyle/>
-          <a:p>
-            <a:r>
-              <a:rPr lang="en-US" dirty="0"/>
-              <a:t>400 fish were initially tagged</a:t>
-            </a:r>
-          </a:p>
-          <a:p>
-            <a:r>
-              <a:rPr lang="en-US" dirty="0"/>
-              <a:t>Tags were returned from the fishery over the next four years</a:t>
-            </a:r>
-          </a:p>
-          <a:p>
-            <a:pPr lvl="1"/>
-            <a:r>
-              <a:rPr lang="en-US" dirty="0"/>
-              <a:t>Consider the time period to be the midpoints of the years.</a:t>
-            </a:r>
-          </a:p>
-          <a:p>
-            <a:endParaRPr lang="en-US" dirty="0"/>
-          </a:p>
-          <a:p>
-            <a:r>
-              <a:rPr lang="en-US" dirty="0"/>
-              <a:t>Use these data to estimate Z &amp; F (see HO).</a:t>
-            </a:r>
-          </a:p>
-        </p:txBody>
-      </p:sp>
-    </p:spTree>
-  </p:cSld>
-  <p:clrMapOvr>
-    <a:masterClrMapping/>
-  </p:clrMapOvr>
-  <p:timing>
-    <p:tnLst>
-      <p:par>
-        <p:cTn id="1" dur="indefinite" restart="never" nodeType="tmRoot">
-          <p:childTnLst>
-            <p:seq concurrent="1" nextAc="seek">
-              <p:cTn id="2" dur="indefinite" nodeType="mainSeq">
-                <p:childTnLst>
-                  <p:par>
-                    <p:cTn id="3" fill="hold">
-                      <p:stCondLst>
-                        <p:cond delay="indefinite"/>
-                      </p:stCondLst>
-                      <p:childTnLst>
-                        <p:par>
-                          <p:cTn id="4" fill="hold">
-                            <p:stCondLst>
-                              <p:cond delay="0"/>
-                            </p:stCondLst>
-                            <p:childTnLst>
-                              <p:par>
-                                <p:cTn id="5" presetID="1" presetClass="entr" presetSubtype="0" fill="hold" grpId="0" nodeType="clickEffect">
-                                  <p:stCondLst>
-                                    <p:cond delay="0"/>
-                                  </p:stCondLst>
-                                  <p:childTnLst>
-                                    <p:set>
-                                      <p:cBhvr>
-                                        <p:cTn id="6" dur="1" fill="hold">
-                                          <p:stCondLst>
-                                            <p:cond delay="0"/>
-                                          </p:stCondLst>
-                                        </p:cTn>
-                                        <p:tgtEl>
-                                          <p:spTgt spid="427011">
-                                            <p:txEl>
-                                              <p:pRg st="1" end="1"/>
-                                            </p:txEl>
-                                          </p:spTgt>
-                                        </p:tgtEl>
-                                        <p:attrNameLst>
-                                          <p:attrName>style.visibility</p:attrName>
-                                        </p:attrNameLst>
-                                      </p:cBhvr>
-                                      <p:to>
-                                        <p:strVal val="visible"/>
-                                      </p:to>
-                                    </p:set>
-                                  </p:childTnLst>
-                                </p:cTn>
-                              </p:par>
-                            </p:childTnLst>
-                          </p:cTn>
-                        </p:par>
-                      </p:childTnLst>
-                    </p:cTn>
-                  </p:par>
-                  <p:par>
-                    <p:cTn id="7" fill="hold">
-                      <p:stCondLst>
-                        <p:cond delay="indefinite"/>
-                      </p:stCondLst>
-                      <p:childTnLst>
-                        <p:par>
-                          <p:cTn id="8" fill="hold">
-                            <p:stCondLst>
-                              <p:cond delay="0"/>
-                            </p:stCondLst>
-                            <p:childTnLst>
-                              <p:par>
-                                <p:cTn id="9" presetID="1" presetClass="entr" presetSubtype="0" fill="hold" grpId="0" nodeType="clickEffect">
-                                  <p:stCondLst>
-                                    <p:cond delay="0"/>
-                                  </p:stCondLst>
-                                  <p:childTnLst>
-                                    <p:set>
-                                      <p:cBhvr>
-                                        <p:cTn id="10" dur="1" fill="hold">
-                                          <p:stCondLst>
-                                            <p:cond delay="0"/>
-                                          </p:stCondLst>
-                                        </p:cTn>
-                                        <p:tgtEl>
-                                          <p:spTgt spid="427011">
-                                            <p:txEl>
-                                              <p:pRg st="2" end="2"/>
-                                            </p:txEl>
-                                          </p:spTgt>
-                                        </p:tgtEl>
-                                        <p:attrNameLst>
-                                          <p:attrName>style.visibility</p:attrName>
-                                        </p:attrNameLst>
-                                      </p:cBhvr>
-                                      <p:to>
-                                        <p:strVal val="visible"/>
-                                      </p:to>
-                                    </p:set>
-                                  </p:childTnLst>
-                                </p:cTn>
-                              </p:par>
-                            </p:childTnLst>
-                          </p:cTn>
-                        </p:par>
-                      </p:childTnLst>
-                    </p:cTn>
-                  </p:par>
-                  <p:par>
-                    <p:cTn id="11" fill="hold">
-                      <p:stCondLst>
-                        <p:cond delay="indefinite"/>
-                      </p:stCondLst>
-                      <p:childTnLst>
-                        <p:par>
-                          <p:cTn id="12" fill="hold">
-                            <p:stCondLst>
-                              <p:cond delay="0"/>
-                            </p:stCondLst>
-                            <p:childTnLst>
-                              <p:par>
-                                <p:cTn id="13" presetID="1" presetClass="entr" presetSubtype="0" fill="hold" grpId="0" nodeType="clickEffect">
-                                  <p:stCondLst>
-                                    <p:cond delay="0"/>
-                                  </p:stCondLst>
-                                  <p:childTnLst>
-                                    <p:set>
-                                      <p:cBhvr>
-                                        <p:cTn id="14" dur="1" fill="hold">
-                                          <p:stCondLst>
-                                            <p:cond delay="0"/>
-                                          </p:stCondLst>
-                                        </p:cTn>
-                                        <p:tgtEl>
-                                          <p:spTgt spid="427011">
-                                            <p:txEl>
-                                              <p:pRg st="4" end="4"/>
-                                            </p:txEl>
-                                          </p:spTgt>
-                                        </p:tgtEl>
-                                        <p:attrNameLst>
-                                          <p:attrName>style.visibility</p:attrName>
-                                        </p:attrNameLst>
-                                      </p:cBhvr>
-                                      <p:to>
-                                        <p:strVal val="visible"/>
-                                      </p:to>
-                                    </p:set>
-                                  </p:childTnLst>
-                                </p:cTn>
-                              </p:par>
-                            </p:childTnLst>
-                          </p:cTn>
-                        </p:par>
-                      </p:childTnLst>
-                    </p:cTn>
-                  </p:par>
-                </p:childTnLst>
-              </p:cTn>
-              <p:prevCondLst>
-                <p:cond evt="onPrev" delay="0">
-                  <p:tgtEl>
-                    <p:sldTgt/>
-                  </p:tgtEl>
-                </p:cond>
-              </p:prevCondLst>
-              <p:nextCondLst>
-                <p:cond evt="onNext" delay="0">
-                  <p:tgtEl>
-                    <p:sldTgt/>
-                  </p:tgtEl>
-                </p:cond>
-              </p:nextCondLst>
-            </p:seq>
-          </p:childTnLst>
-        </p:cTn>
-      </p:par>
-    </p:tnLst>
-    <p:bldLst>
-      <p:bldP spid="427011" grpId="0" build="p"/>
     </p:bldLst>
   </p:timing>
 </p:sld>

</xml_diff>